<commit_message>
Các nội dung chính của Block
</commit_message>
<xml_diff>
--- a/Block_VatLy_6_AmThanh.pptx
+++ b/Block_VatLy_6_AmThanh.pptx
@@ -6,6 +6,7 @@
   </p:sldMasterIdLst>
   <p:sldIdLst>
     <p:sldId id="256" r:id="rId2"/>
+    <p:sldId id="257" r:id="rId3"/>
   </p:sldIdLst>
   <p:sldSz cx="12192000" cy="6858000"/>
   <p:notesSz cx="6858000" cy="9144000"/>
@@ -104,6 +105,11 @@
       </a:defRPr>
     </a:lvl9pPr>
   </p:defaultTextStyle>
+  <p:extLst>
+    <p:ext uri="{EFAFB233-063F-42B5-8137-9DF3F51BA10A}">
+      <p15:sldGuideLst xmlns:p15="http://schemas.microsoft.com/office/powerpoint/2012/main"/>
+    </p:ext>
+  </p:extLst>
 </p:presentation>
 </file>
 
@@ -3005,7 +3011,7 @@
         <p:spPr>
           <a:xfrm>
             <a:off x="1524000" y="2432649"/>
-            <a:ext cx="9144000" cy="2825151"/>
+            <a:ext cx="9144000" cy="3226279"/>
           </a:xfrm>
         </p:spPr>
         <p:txBody>
@@ -3014,8 +3020,59 @@
           <a:p>
             <a:pPr algn="just"/>
             <a:r>
-              <a:rPr lang="vi-VN" smtClean="0"/>
-              <a:t>Cung cấp các kiến thức sơ khởi về âm học</a:t>
+              <a:rPr lang="vi-VN" dirty="0" smtClean="0"/>
+              <a:t>Người trực tiếp thiết kế Block: Cô </a:t>
+            </a:r>
+            <a:r>
+              <a:rPr lang="vi-VN" b="1" dirty="0" smtClean="0">
+                <a:solidFill>
+                  <a:srgbClr val="FF0000"/>
+                </a:solidFill>
+              </a:rPr>
+              <a:t>Hải Anh</a:t>
+            </a:r>
+          </a:p>
+          <a:p>
+            <a:pPr algn="just"/>
+            <a:r>
+              <a:rPr lang="vi-VN" dirty="0" smtClean="0"/>
+              <a:t>Người dựng khung và hiệu chuẩn: </a:t>
+            </a:r>
+            <a:r>
+              <a:rPr lang="vi-VN" b="1" dirty="0" smtClean="0">
+                <a:solidFill>
+                  <a:srgbClr val="FF0000"/>
+                </a:solidFill>
+              </a:rPr>
+              <a:t>Thầy Lê Thọ</a:t>
+            </a:r>
+            <a:endParaRPr lang="vi-VN" b="1" dirty="0" smtClean="0">
+              <a:solidFill>
+                <a:srgbClr val="FF0000"/>
+              </a:solidFill>
+            </a:endParaRPr>
+          </a:p>
+          <a:p>
+            <a:pPr algn="just"/>
+            <a:r>
+              <a:rPr lang="vi-VN" dirty="0" smtClean="0"/>
+              <a:t>Cung </a:t>
+            </a:r>
+            <a:r>
+              <a:rPr lang="vi-VN" dirty="0" smtClean="0"/>
+              <a:t>cấp các kiến thức sơ khởi về âm </a:t>
+            </a:r>
+            <a:r>
+              <a:rPr lang="vi-VN" dirty="0" smtClean="0"/>
+              <a:t>học</a:t>
+            </a:r>
+            <a:r>
+              <a:rPr lang="en-US" dirty="0" smtClean="0"/>
+              <a:t>. Block </a:t>
+            </a:r>
+            <a:r>
+              <a:rPr lang="vi-VN" dirty="0" smtClean="0"/>
+              <a:t>này tập trung vào sự cảm nhận âm thanh dựa trên các giác quan tự nhiên của con người, không đề cập đến các kiến thức định lượng.</a:t>
             </a:r>
             <a:endParaRPr lang="en-US" dirty="0"/>
           </a:p>
@@ -3025,6 +3082,145 @@
     <p:extLst>
       <p:ext uri="{BB962C8B-B14F-4D97-AF65-F5344CB8AC3E}">
         <p14:creationId xmlns:p14="http://schemas.microsoft.com/office/powerpoint/2010/main" val="4155561767"/>
+      </p:ext>
+    </p:extLst>
+  </p:cSld>
+  <p:clrMapOvr>
+    <a:masterClrMapping/>
+  </p:clrMapOvr>
+  <p:timing>
+    <p:tnLst>
+      <p:par>
+        <p:cTn id="1" dur="indefinite" restart="never" nodeType="tmRoot"/>
+      </p:par>
+    </p:tnLst>
+  </p:timing>
+</p:sld>
+</file>
+
+<file path=ppt/slides/slide2.xml><?xml version="1.0" encoding="utf-8"?>
+<p:sld xmlns:a="http://schemas.openxmlformats.org/drawingml/2006/main" xmlns:r="http://schemas.openxmlformats.org/officeDocument/2006/relationships" xmlns:p="http://schemas.openxmlformats.org/presentationml/2006/main">
+  <p:cSld>
+    <p:spTree>
+      <p:nvGrpSpPr>
+        <p:cNvPr id="1" name=""/>
+        <p:cNvGrpSpPr/>
+        <p:nvPr/>
+      </p:nvGrpSpPr>
+      <p:grpSpPr>
+        <a:xfrm>
+          <a:off x="0" y="0"/>
+          <a:ext cx="0" cy="0"/>
+          <a:chOff x="0" y="0"/>
+          <a:chExt cx="0" cy="0"/>
+        </a:xfrm>
+      </p:grpSpPr>
+      <p:sp>
+        <p:nvSpPr>
+          <p:cNvPr id="2" name="Title 1"/>
+          <p:cNvSpPr>
+            <a:spLocks noGrp="1"/>
+          </p:cNvSpPr>
+          <p:nvPr>
+            <p:ph type="title"/>
+          </p:nvPr>
+        </p:nvSpPr>
+        <p:spPr>
+          <a:xfrm>
+            <a:off x="838200" y="365126"/>
+            <a:ext cx="10515600" cy="687298"/>
+          </a:xfrm>
+        </p:spPr>
+        <p:txBody>
+          <a:bodyPr>
+            <a:normAutofit fontScale="90000"/>
+          </a:bodyPr>
+          <a:lstStyle/>
+          <a:p>
+            <a:r>
+              <a:rPr lang="vi-VN" smtClean="0"/>
+              <a:t>Các nội dung chính của Block</a:t>
+            </a:r>
+            <a:endParaRPr lang="en-US" dirty="0"/>
+          </a:p>
+        </p:txBody>
+      </p:sp>
+      <p:sp>
+        <p:nvSpPr>
+          <p:cNvPr id="3" name="Content Placeholder 2"/>
+          <p:cNvSpPr>
+            <a:spLocks noGrp="1"/>
+          </p:cNvSpPr>
+          <p:nvPr>
+            <p:ph idx="1"/>
+          </p:nvPr>
+        </p:nvSpPr>
+        <p:spPr>
+          <a:xfrm>
+            <a:off x="838200" y="1147313"/>
+            <a:ext cx="10515600" cy="3122762"/>
+          </a:xfrm>
+        </p:spPr>
+        <p:txBody>
+          <a:bodyPr/>
+          <a:lstStyle/>
+          <a:p>
+            <a:pPr marL="514350" indent="-514350">
+              <a:buFont typeface="+mj-lt"/>
+              <a:buAutoNum type="arabicPeriod"/>
+            </a:pPr>
+            <a:r>
+              <a:rPr lang="vi-VN" dirty="0" smtClean="0"/>
+              <a:t>Sự cảm nhận âm thanh của con người</a:t>
+            </a:r>
+          </a:p>
+          <a:p>
+            <a:pPr marL="514350" indent="-514350">
+              <a:buFont typeface="+mj-lt"/>
+              <a:buAutoNum type="arabicPeriod"/>
+            </a:pPr>
+            <a:r>
+              <a:rPr lang="vi-VN" dirty="0" smtClean="0"/>
+              <a:t>Đặc tính nhạc của âm thanh</a:t>
+            </a:r>
+          </a:p>
+          <a:p>
+            <a:pPr marL="514350" indent="-514350">
+              <a:buFont typeface="+mj-lt"/>
+              <a:buAutoNum type="arabicPeriod"/>
+            </a:pPr>
+            <a:r>
+              <a:rPr lang="vi-VN" dirty="0" smtClean="0"/>
+              <a:t>Độ cao, độ mạnh của âm thanh</a:t>
+            </a:r>
+          </a:p>
+          <a:p>
+            <a:pPr marL="514350" indent="-514350">
+              <a:buFont typeface="+mj-lt"/>
+              <a:buAutoNum type="arabicPeriod"/>
+            </a:pPr>
+            <a:r>
+              <a:rPr lang="vi-VN" dirty="0" smtClean="0"/>
+              <a:t>Đặc tính cơ học của âm thanh, nguồn âm thanh. Đánh giá 3 bộ nhạc cụ và cách tạo âm thanh của chúng</a:t>
+            </a:r>
+          </a:p>
+          <a:p>
+            <a:pPr marL="514350" indent="-514350">
+              <a:buFont typeface="+mj-lt"/>
+              <a:buAutoNum type="arabicPeriod"/>
+            </a:pPr>
+            <a:r>
+              <a:rPr lang="vi-VN" dirty="0" smtClean="0"/>
+              <a:t>Sự ảnh hưởng của môi trường truyền âm</a:t>
+            </a:r>
+            <a:endParaRPr lang="en-US" dirty="0"/>
+          </a:p>
+        </p:txBody>
+      </p:sp>
+    </p:spTree>
+    <p:extLst>
+      <p:ext uri="{BB962C8B-B14F-4D97-AF65-F5344CB8AC3E}">
+        <p14:creationId xmlns:p14="http://schemas.microsoft.com/office/powerpoint/2010/main" val="2177914449"/>
       </p:ext>
     </p:extLst>
   </p:cSld>

</xml_diff>

<commit_message>
Cô HA viết thêm Lession
</commit_message>
<xml_diff>
--- a/Block_VatLy_6_AmThanh.pptx
+++ b/Block_VatLy_6_AmThanh.pptx
@@ -7,6 +7,7 @@
   <p:sldIdLst>
     <p:sldId id="256" r:id="rId2"/>
     <p:sldId id="257" r:id="rId3"/>
+    <p:sldId id="258" r:id="rId4"/>
   </p:sldIdLst>
   <p:sldSz cx="12192000" cy="6858000"/>
   <p:notesSz cx="6858000" cy="9144000"/>
@@ -155,10 +156,9 @@
           </a:lstStyle>
           <a:p>
             <a:r>
-              <a:rPr lang="en-US" smtClean="0"/>
+              <a:rPr lang="en-US"/>
               <a:t>Click to edit Master title style</a:t>
             </a:r>
-            <a:endParaRPr lang="en-US"/>
           </a:p>
         </p:txBody>
       </p:sp>
@@ -220,10 +220,9 @@
           </a:lstStyle>
           <a:p>
             <a:r>
-              <a:rPr lang="en-US" smtClean="0"/>
+              <a:rPr lang="en-US"/>
               <a:t>Click to edit Master subtitle style</a:t>
             </a:r>
-            <a:endParaRPr lang="en-US"/>
           </a:p>
         </p:txBody>
       </p:sp>
@@ -244,7 +243,7 @@
           <a:p>
             <a:fld id="{659F8ED3-1E5F-4914-B9DD-FAF679EFBFC0}" type="datetimeFigureOut">
               <a:rPr lang="en-US" smtClean="0"/>
-              <a:t>4/3/2022</a:t>
+              <a:t>4/9/2022</a:t>
             </a:fld>
             <a:endParaRPr lang="en-US"/>
           </a:p>
@@ -338,10 +337,9 @@
           <a:lstStyle/>
           <a:p>
             <a:r>
-              <a:rPr lang="en-US" smtClean="0"/>
+              <a:rPr lang="en-US"/>
               <a:t>Click to edit Master title style</a:t>
             </a:r>
-            <a:endParaRPr lang="en-US"/>
           </a:p>
         </p:txBody>
       </p:sp>
@@ -362,38 +360,37 @@
           <a:p>
             <a:pPr lvl="0"/>
             <a:r>
-              <a:rPr lang="en-US" smtClean="0"/>
+              <a:rPr lang="en-US"/>
               <a:t>Edit Master text styles</a:t>
             </a:r>
           </a:p>
           <a:p>
             <a:pPr lvl="1"/>
             <a:r>
-              <a:rPr lang="en-US" smtClean="0"/>
+              <a:rPr lang="en-US"/>
               <a:t>Second level</a:t>
             </a:r>
           </a:p>
           <a:p>
             <a:pPr lvl="2"/>
             <a:r>
-              <a:rPr lang="en-US" smtClean="0"/>
+              <a:rPr lang="en-US"/>
               <a:t>Third level</a:t>
             </a:r>
           </a:p>
           <a:p>
             <a:pPr lvl="3"/>
             <a:r>
-              <a:rPr lang="en-US" smtClean="0"/>
+              <a:rPr lang="en-US"/>
               <a:t>Fourth level</a:t>
             </a:r>
           </a:p>
           <a:p>
             <a:pPr lvl="4"/>
             <a:r>
-              <a:rPr lang="en-US" smtClean="0"/>
+              <a:rPr lang="en-US"/>
               <a:t>Fifth level</a:t>
             </a:r>
-            <a:endParaRPr lang="en-US"/>
           </a:p>
         </p:txBody>
       </p:sp>
@@ -414,7 +411,7 @@
           <a:p>
             <a:fld id="{659F8ED3-1E5F-4914-B9DD-FAF679EFBFC0}" type="datetimeFigureOut">
               <a:rPr lang="en-US" smtClean="0"/>
-              <a:t>4/3/2022</a:t>
+              <a:t>4/9/2022</a:t>
             </a:fld>
             <a:endParaRPr lang="en-US"/>
           </a:p>
@@ -513,10 +510,9 @@
           <a:lstStyle/>
           <a:p>
             <a:r>
-              <a:rPr lang="en-US" smtClean="0"/>
+              <a:rPr lang="en-US"/>
               <a:t>Click to edit Master title style</a:t>
             </a:r>
-            <a:endParaRPr lang="en-US"/>
           </a:p>
         </p:txBody>
       </p:sp>
@@ -542,38 +538,37 @@
           <a:p>
             <a:pPr lvl="0"/>
             <a:r>
-              <a:rPr lang="en-US" smtClean="0"/>
+              <a:rPr lang="en-US"/>
               <a:t>Edit Master text styles</a:t>
             </a:r>
           </a:p>
           <a:p>
             <a:pPr lvl="1"/>
             <a:r>
-              <a:rPr lang="en-US" smtClean="0"/>
+              <a:rPr lang="en-US"/>
               <a:t>Second level</a:t>
             </a:r>
           </a:p>
           <a:p>
             <a:pPr lvl="2"/>
             <a:r>
-              <a:rPr lang="en-US" smtClean="0"/>
+              <a:rPr lang="en-US"/>
               <a:t>Third level</a:t>
             </a:r>
           </a:p>
           <a:p>
             <a:pPr lvl="3"/>
             <a:r>
-              <a:rPr lang="en-US" smtClean="0"/>
+              <a:rPr lang="en-US"/>
               <a:t>Fourth level</a:t>
             </a:r>
           </a:p>
           <a:p>
             <a:pPr lvl="4"/>
             <a:r>
-              <a:rPr lang="en-US" smtClean="0"/>
+              <a:rPr lang="en-US"/>
               <a:t>Fifth level</a:t>
             </a:r>
-            <a:endParaRPr lang="en-US"/>
           </a:p>
         </p:txBody>
       </p:sp>
@@ -594,7 +589,7 @@
           <a:p>
             <a:fld id="{659F8ED3-1E5F-4914-B9DD-FAF679EFBFC0}" type="datetimeFigureOut">
               <a:rPr lang="en-US" smtClean="0"/>
-              <a:t>4/3/2022</a:t>
+              <a:t>4/9/2022</a:t>
             </a:fld>
             <a:endParaRPr lang="en-US"/>
           </a:p>
@@ -688,10 +683,9 @@
           <a:lstStyle/>
           <a:p>
             <a:r>
-              <a:rPr lang="en-US" smtClean="0"/>
+              <a:rPr lang="en-US"/>
               <a:t>Click to edit Master title style</a:t>
             </a:r>
-            <a:endParaRPr lang="en-US"/>
           </a:p>
         </p:txBody>
       </p:sp>
@@ -712,38 +706,37 @@
           <a:p>
             <a:pPr lvl="0"/>
             <a:r>
-              <a:rPr lang="en-US" smtClean="0"/>
+              <a:rPr lang="en-US"/>
               <a:t>Edit Master text styles</a:t>
             </a:r>
           </a:p>
           <a:p>
             <a:pPr lvl="1"/>
             <a:r>
-              <a:rPr lang="en-US" smtClean="0"/>
+              <a:rPr lang="en-US"/>
               <a:t>Second level</a:t>
             </a:r>
           </a:p>
           <a:p>
             <a:pPr lvl="2"/>
             <a:r>
-              <a:rPr lang="en-US" smtClean="0"/>
+              <a:rPr lang="en-US"/>
               <a:t>Third level</a:t>
             </a:r>
           </a:p>
           <a:p>
             <a:pPr lvl="3"/>
             <a:r>
-              <a:rPr lang="en-US" smtClean="0"/>
+              <a:rPr lang="en-US"/>
               <a:t>Fourth level</a:t>
             </a:r>
           </a:p>
           <a:p>
             <a:pPr lvl="4"/>
             <a:r>
-              <a:rPr lang="en-US" smtClean="0"/>
+              <a:rPr lang="en-US"/>
               <a:t>Fifth level</a:t>
             </a:r>
-            <a:endParaRPr lang="en-US"/>
           </a:p>
         </p:txBody>
       </p:sp>
@@ -764,7 +757,7 @@
           <a:p>
             <a:fld id="{659F8ED3-1E5F-4914-B9DD-FAF679EFBFC0}" type="datetimeFigureOut">
               <a:rPr lang="en-US" smtClean="0"/>
-              <a:t>4/3/2022</a:t>
+              <a:t>4/9/2022</a:t>
             </a:fld>
             <a:endParaRPr lang="en-US"/>
           </a:p>
@@ -867,10 +860,9 @@
           </a:lstStyle>
           <a:p>
             <a:r>
-              <a:rPr lang="en-US" smtClean="0"/>
+              <a:rPr lang="en-US"/>
               <a:t>Click to edit Master title style</a:t>
             </a:r>
-            <a:endParaRPr lang="en-US"/>
           </a:p>
         </p:txBody>
       </p:sp>
@@ -987,7 +979,7 @@
           <a:p>
             <a:pPr lvl="0"/>
             <a:r>
-              <a:rPr lang="en-US" smtClean="0"/>
+              <a:rPr lang="en-US"/>
               <a:t>Edit Master text styles</a:t>
             </a:r>
           </a:p>
@@ -1010,7 +1002,7 @@
           <a:p>
             <a:fld id="{659F8ED3-1E5F-4914-B9DD-FAF679EFBFC0}" type="datetimeFigureOut">
               <a:rPr lang="en-US" smtClean="0"/>
-              <a:t>4/3/2022</a:t>
+              <a:t>4/9/2022</a:t>
             </a:fld>
             <a:endParaRPr lang="en-US"/>
           </a:p>
@@ -1104,10 +1096,9 @@
           <a:lstStyle/>
           <a:p>
             <a:r>
-              <a:rPr lang="en-US" smtClean="0"/>
+              <a:rPr lang="en-US"/>
               <a:t>Click to edit Master title style</a:t>
             </a:r>
-            <a:endParaRPr lang="en-US"/>
           </a:p>
         </p:txBody>
       </p:sp>
@@ -1133,38 +1124,37 @@
           <a:p>
             <a:pPr lvl="0"/>
             <a:r>
-              <a:rPr lang="en-US" smtClean="0"/>
+              <a:rPr lang="en-US"/>
               <a:t>Edit Master text styles</a:t>
             </a:r>
           </a:p>
           <a:p>
             <a:pPr lvl="1"/>
             <a:r>
-              <a:rPr lang="en-US" smtClean="0"/>
+              <a:rPr lang="en-US"/>
               <a:t>Second level</a:t>
             </a:r>
           </a:p>
           <a:p>
             <a:pPr lvl="2"/>
             <a:r>
-              <a:rPr lang="en-US" smtClean="0"/>
+              <a:rPr lang="en-US"/>
               <a:t>Third level</a:t>
             </a:r>
           </a:p>
           <a:p>
             <a:pPr lvl="3"/>
             <a:r>
-              <a:rPr lang="en-US" smtClean="0"/>
+              <a:rPr lang="en-US"/>
               <a:t>Fourth level</a:t>
             </a:r>
           </a:p>
           <a:p>
             <a:pPr lvl="4"/>
             <a:r>
-              <a:rPr lang="en-US" smtClean="0"/>
+              <a:rPr lang="en-US"/>
               <a:t>Fifth level</a:t>
             </a:r>
-            <a:endParaRPr lang="en-US"/>
           </a:p>
         </p:txBody>
       </p:sp>
@@ -1190,38 +1180,37 @@
           <a:p>
             <a:pPr lvl="0"/>
             <a:r>
-              <a:rPr lang="en-US" smtClean="0"/>
+              <a:rPr lang="en-US"/>
               <a:t>Edit Master text styles</a:t>
             </a:r>
           </a:p>
           <a:p>
             <a:pPr lvl="1"/>
             <a:r>
-              <a:rPr lang="en-US" smtClean="0"/>
+              <a:rPr lang="en-US"/>
               <a:t>Second level</a:t>
             </a:r>
           </a:p>
           <a:p>
             <a:pPr lvl="2"/>
             <a:r>
-              <a:rPr lang="en-US" smtClean="0"/>
+              <a:rPr lang="en-US"/>
               <a:t>Third level</a:t>
             </a:r>
           </a:p>
           <a:p>
             <a:pPr lvl="3"/>
             <a:r>
-              <a:rPr lang="en-US" smtClean="0"/>
+              <a:rPr lang="en-US"/>
               <a:t>Fourth level</a:t>
             </a:r>
           </a:p>
           <a:p>
             <a:pPr lvl="4"/>
             <a:r>
-              <a:rPr lang="en-US" smtClean="0"/>
+              <a:rPr lang="en-US"/>
               <a:t>Fifth level</a:t>
             </a:r>
-            <a:endParaRPr lang="en-US"/>
           </a:p>
         </p:txBody>
       </p:sp>
@@ -1242,7 +1231,7 @@
           <a:p>
             <a:fld id="{659F8ED3-1E5F-4914-B9DD-FAF679EFBFC0}" type="datetimeFigureOut">
               <a:rPr lang="en-US" smtClean="0"/>
-              <a:t>4/3/2022</a:t>
+              <a:t>4/9/2022</a:t>
             </a:fld>
             <a:endParaRPr lang="en-US"/>
           </a:p>
@@ -1341,10 +1330,9 @@
           <a:lstStyle/>
           <a:p>
             <a:r>
-              <a:rPr lang="en-US" smtClean="0"/>
+              <a:rPr lang="en-US"/>
               <a:t>Click to edit Master title style</a:t>
             </a:r>
-            <a:endParaRPr lang="en-US"/>
           </a:p>
         </p:txBody>
       </p:sp>
@@ -1407,7 +1395,7 @@
           <a:p>
             <a:pPr lvl="0"/>
             <a:r>
-              <a:rPr lang="en-US" smtClean="0"/>
+              <a:rPr lang="en-US"/>
               <a:t>Edit Master text styles</a:t>
             </a:r>
           </a:p>
@@ -1435,38 +1423,37 @@
           <a:p>
             <a:pPr lvl="0"/>
             <a:r>
-              <a:rPr lang="en-US" smtClean="0"/>
+              <a:rPr lang="en-US"/>
               <a:t>Edit Master text styles</a:t>
             </a:r>
           </a:p>
           <a:p>
             <a:pPr lvl="1"/>
             <a:r>
-              <a:rPr lang="en-US" smtClean="0"/>
+              <a:rPr lang="en-US"/>
               <a:t>Second level</a:t>
             </a:r>
           </a:p>
           <a:p>
             <a:pPr lvl="2"/>
             <a:r>
-              <a:rPr lang="en-US" smtClean="0"/>
+              <a:rPr lang="en-US"/>
               <a:t>Third level</a:t>
             </a:r>
           </a:p>
           <a:p>
             <a:pPr lvl="3"/>
             <a:r>
-              <a:rPr lang="en-US" smtClean="0"/>
+              <a:rPr lang="en-US"/>
               <a:t>Fourth level</a:t>
             </a:r>
           </a:p>
           <a:p>
             <a:pPr lvl="4"/>
             <a:r>
-              <a:rPr lang="en-US" smtClean="0"/>
+              <a:rPr lang="en-US"/>
               <a:t>Fifth level</a:t>
             </a:r>
-            <a:endParaRPr lang="en-US"/>
           </a:p>
         </p:txBody>
       </p:sp>
@@ -1529,7 +1516,7 @@
           <a:p>
             <a:pPr lvl="0"/>
             <a:r>
-              <a:rPr lang="en-US" smtClean="0"/>
+              <a:rPr lang="en-US"/>
               <a:t>Edit Master text styles</a:t>
             </a:r>
           </a:p>
@@ -1557,38 +1544,37 @@
           <a:p>
             <a:pPr lvl="0"/>
             <a:r>
-              <a:rPr lang="en-US" smtClean="0"/>
+              <a:rPr lang="en-US"/>
               <a:t>Edit Master text styles</a:t>
             </a:r>
           </a:p>
           <a:p>
             <a:pPr lvl="1"/>
             <a:r>
-              <a:rPr lang="en-US" smtClean="0"/>
+              <a:rPr lang="en-US"/>
               <a:t>Second level</a:t>
             </a:r>
           </a:p>
           <a:p>
             <a:pPr lvl="2"/>
             <a:r>
-              <a:rPr lang="en-US" smtClean="0"/>
+              <a:rPr lang="en-US"/>
               <a:t>Third level</a:t>
             </a:r>
           </a:p>
           <a:p>
             <a:pPr lvl="3"/>
             <a:r>
-              <a:rPr lang="en-US" smtClean="0"/>
+              <a:rPr lang="en-US"/>
               <a:t>Fourth level</a:t>
             </a:r>
           </a:p>
           <a:p>
             <a:pPr lvl="4"/>
             <a:r>
-              <a:rPr lang="en-US" smtClean="0"/>
+              <a:rPr lang="en-US"/>
               <a:t>Fifth level</a:t>
             </a:r>
-            <a:endParaRPr lang="en-US"/>
           </a:p>
         </p:txBody>
       </p:sp>
@@ -1609,7 +1595,7 @@
           <a:p>
             <a:fld id="{659F8ED3-1E5F-4914-B9DD-FAF679EFBFC0}" type="datetimeFigureOut">
               <a:rPr lang="en-US" smtClean="0"/>
-              <a:t>4/3/2022</a:t>
+              <a:t>4/9/2022</a:t>
             </a:fld>
             <a:endParaRPr lang="en-US"/>
           </a:p>
@@ -1703,10 +1689,9 @@
           <a:lstStyle/>
           <a:p>
             <a:r>
-              <a:rPr lang="en-US" smtClean="0"/>
+              <a:rPr lang="en-US"/>
               <a:t>Click to edit Master title style</a:t>
             </a:r>
-            <a:endParaRPr lang="en-US"/>
           </a:p>
         </p:txBody>
       </p:sp>
@@ -1727,7 +1712,7 @@
           <a:p>
             <a:fld id="{659F8ED3-1E5F-4914-B9DD-FAF679EFBFC0}" type="datetimeFigureOut">
               <a:rPr lang="en-US" smtClean="0"/>
-              <a:t>4/3/2022</a:t>
+              <a:t>4/9/2022</a:t>
             </a:fld>
             <a:endParaRPr lang="en-US"/>
           </a:p>
@@ -1822,7 +1807,7 @@
           <a:p>
             <a:fld id="{659F8ED3-1E5F-4914-B9DD-FAF679EFBFC0}" type="datetimeFigureOut">
               <a:rPr lang="en-US" smtClean="0"/>
-              <a:t>4/3/2022</a:t>
+              <a:t>4/9/2022</a:t>
             </a:fld>
             <a:endParaRPr lang="en-US"/>
           </a:p>
@@ -1925,10 +1910,9 @@
           </a:lstStyle>
           <a:p>
             <a:r>
-              <a:rPr lang="en-US" smtClean="0"/>
+              <a:rPr lang="en-US"/>
               <a:t>Click to edit Master title style</a:t>
             </a:r>
-            <a:endParaRPr lang="en-US"/>
           </a:p>
         </p:txBody>
       </p:sp>
@@ -1982,38 +1966,37 @@
           <a:p>
             <a:pPr lvl="0"/>
             <a:r>
-              <a:rPr lang="en-US" smtClean="0"/>
+              <a:rPr lang="en-US"/>
               <a:t>Edit Master text styles</a:t>
             </a:r>
           </a:p>
           <a:p>
             <a:pPr lvl="1"/>
             <a:r>
-              <a:rPr lang="en-US" smtClean="0"/>
+              <a:rPr lang="en-US"/>
               <a:t>Second level</a:t>
             </a:r>
           </a:p>
           <a:p>
             <a:pPr lvl="2"/>
             <a:r>
-              <a:rPr lang="en-US" smtClean="0"/>
+              <a:rPr lang="en-US"/>
               <a:t>Third level</a:t>
             </a:r>
           </a:p>
           <a:p>
             <a:pPr lvl="3"/>
             <a:r>
-              <a:rPr lang="en-US" smtClean="0"/>
+              <a:rPr lang="en-US"/>
               <a:t>Fourth level</a:t>
             </a:r>
           </a:p>
           <a:p>
             <a:pPr lvl="4"/>
             <a:r>
-              <a:rPr lang="en-US" smtClean="0"/>
+              <a:rPr lang="en-US"/>
               <a:t>Fifth level</a:t>
             </a:r>
-            <a:endParaRPr lang="en-US"/>
           </a:p>
         </p:txBody>
       </p:sp>
@@ -2076,7 +2059,7 @@
           <a:p>
             <a:pPr lvl="0"/>
             <a:r>
-              <a:rPr lang="en-US" smtClean="0"/>
+              <a:rPr lang="en-US"/>
               <a:t>Edit Master text styles</a:t>
             </a:r>
           </a:p>
@@ -2099,7 +2082,7 @@
           <a:p>
             <a:fld id="{659F8ED3-1E5F-4914-B9DD-FAF679EFBFC0}" type="datetimeFigureOut">
               <a:rPr lang="en-US" smtClean="0"/>
-              <a:t>4/3/2022</a:t>
+              <a:t>4/9/2022</a:t>
             </a:fld>
             <a:endParaRPr lang="en-US"/>
           </a:p>
@@ -2202,10 +2185,9 @@
           </a:lstStyle>
           <a:p>
             <a:r>
-              <a:rPr lang="en-US" smtClean="0"/>
+              <a:rPr lang="en-US"/>
               <a:t>Click to edit Master title style</a:t>
             </a:r>
-            <a:endParaRPr lang="en-US"/>
           </a:p>
         </p:txBody>
       </p:sp>
@@ -2329,7 +2311,7 @@
           <a:p>
             <a:pPr lvl="0"/>
             <a:r>
-              <a:rPr lang="en-US" smtClean="0"/>
+              <a:rPr lang="en-US"/>
               <a:t>Edit Master text styles</a:t>
             </a:r>
           </a:p>
@@ -2352,7 +2334,7 @@
           <a:p>
             <a:fld id="{659F8ED3-1E5F-4914-B9DD-FAF679EFBFC0}" type="datetimeFigureOut">
               <a:rPr lang="en-US" smtClean="0"/>
-              <a:t>4/3/2022</a:t>
+              <a:t>4/9/2022</a:t>
             </a:fld>
             <a:endParaRPr lang="en-US"/>
           </a:p>
@@ -2461,10 +2443,9 @@
           <a:lstStyle/>
           <a:p>
             <a:r>
-              <a:rPr lang="en-US" smtClean="0"/>
+              <a:rPr lang="en-US"/>
               <a:t>Click to edit Master title style</a:t>
             </a:r>
-            <a:endParaRPr lang="en-US"/>
           </a:p>
         </p:txBody>
       </p:sp>
@@ -2495,38 +2476,37 @@
           <a:p>
             <a:pPr lvl="0"/>
             <a:r>
-              <a:rPr lang="en-US" smtClean="0"/>
+              <a:rPr lang="en-US"/>
               <a:t>Edit Master text styles</a:t>
             </a:r>
           </a:p>
           <a:p>
             <a:pPr lvl="1"/>
             <a:r>
-              <a:rPr lang="en-US" smtClean="0"/>
+              <a:rPr lang="en-US"/>
               <a:t>Second level</a:t>
             </a:r>
           </a:p>
           <a:p>
             <a:pPr lvl="2"/>
             <a:r>
-              <a:rPr lang="en-US" smtClean="0"/>
+              <a:rPr lang="en-US"/>
               <a:t>Third level</a:t>
             </a:r>
           </a:p>
           <a:p>
             <a:pPr lvl="3"/>
             <a:r>
-              <a:rPr lang="en-US" smtClean="0"/>
+              <a:rPr lang="en-US"/>
               <a:t>Fourth level</a:t>
             </a:r>
           </a:p>
           <a:p>
             <a:pPr lvl="4"/>
             <a:r>
-              <a:rPr lang="en-US" smtClean="0"/>
+              <a:rPr lang="en-US"/>
               <a:t>Fifth level</a:t>
             </a:r>
-            <a:endParaRPr lang="en-US"/>
           </a:p>
         </p:txBody>
       </p:sp>
@@ -2565,7 +2545,7 @@
           <a:p>
             <a:fld id="{659F8ED3-1E5F-4914-B9DD-FAF679EFBFC0}" type="datetimeFigureOut">
               <a:rPr lang="en-US" smtClean="0"/>
-              <a:t>4/3/2022</a:t>
+              <a:t>4/9/2022</a:t>
             </a:fld>
             <a:endParaRPr lang="en-US"/>
           </a:p>
@@ -2991,7 +2971,7 @@
           <a:lstStyle/>
           <a:p>
             <a:r>
-              <a:rPr lang="vi-VN" smtClean="0"/>
+              <a:rPr lang="vi-VN"/>
               <a:t>Khung Block Vật lý 6</a:t>
             </a:r>
             <a:endParaRPr lang="en-US" dirty="0"/>
@@ -3020,11 +3000,11 @@
           <a:p>
             <a:pPr algn="just"/>
             <a:r>
-              <a:rPr lang="vi-VN" dirty="0" smtClean="0"/>
+              <a:rPr lang="vi-VN" dirty="0"/>
               <a:t>Người trực tiếp thiết kế Block: Cô </a:t>
             </a:r>
             <a:r>
-              <a:rPr lang="vi-VN" b="1" dirty="0" smtClean="0">
+              <a:rPr lang="vi-VN" b="1" dirty="0">
                 <a:solidFill>
                   <a:srgbClr val="FF0000"/>
                 </a:solidFill>
@@ -3035,43 +3015,30 @@
           <a:p>
             <a:pPr algn="just"/>
             <a:r>
-              <a:rPr lang="vi-VN" dirty="0" smtClean="0"/>
+              <a:rPr lang="vi-VN" dirty="0"/>
               <a:t>Người dựng khung và hiệu chuẩn: </a:t>
             </a:r>
             <a:r>
-              <a:rPr lang="vi-VN" b="1" dirty="0" smtClean="0">
+              <a:rPr lang="vi-VN" b="1" dirty="0">
                 <a:solidFill>
                   <a:srgbClr val="FF0000"/>
                 </a:solidFill>
               </a:rPr>
               <a:t>Thầy Lê Thọ</a:t>
             </a:r>
-            <a:endParaRPr lang="vi-VN" b="1" dirty="0" smtClean="0">
-              <a:solidFill>
-                <a:srgbClr val="FF0000"/>
-              </a:solidFill>
-            </a:endParaRPr>
           </a:p>
           <a:p>
             <a:pPr algn="just"/>
             <a:r>
-              <a:rPr lang="vi-VN" dirty="0" smtClean="0"/>
-              <a:t>Cung </a:t>
-            </a:r>
-            <a:r>
-              <a:rPr lang="vi-VN" dirty="0" smtClean="0"/>
-              <a:t>cấp các kiến thức sơ khởi về âm </a:t>
-            </a:r>
-            <a:r>
-              <a:rPr lang="vi-VN" dirty="0" smtClean="0"/>
-              <a:t>học</a:t>
-            </a:r>
-            <a:r>
-              <a:rPr lang="en-US" dirty="0" smtClean="0"/>
+              <a:rPr lang="vi-VN" dirty="0"/>
+              <a:t>Cung cấp các kiến thức sơ khởi về âm học</a:t>
+            </a:r>
+            <a:r>
+              <a:rPr lang="en-US" dirty="0"/>
               <a:t>. Block </a:t>
             </a:r>
             <a:r>
-              <a:rPr lang="vi-VN" dirty="0" smtClean="0"/>
+              <a:rPr lang="vi-VN" dirty="0"/>
               <a:t>này tập trung vào sự cảm nhận âm thanh dựa trên các giác quan tự nhiên của con người, không đề cập đến các kiến thức định lượng.</a:t>
             </a:r>
             <a:endParaRPr lang="en-US" dirty="0"/>
@@ -3088,13 +3055,6 @@
   <p:clrMapOvr>
     <a:masterClrMapping/>
   </p:clrMapOvr>
-  <p:timing>
-    <p:tnLst>
-      <p:par>
-        <p:cTn id="1" dur="indefinite" restart="never" nodeType="tmRoot"/>
-      </p:par>
-    </p:tnLst>
-  </p:timing>
 </p:sld>
 </file>
 
@@ -3138,7 +3098,7 @@
           <a:lstStyle/>
           <a:p>
             <a:r>
-              <a:rPr lang="vi-VN" smtClean="0"/>
+              <a:rPr lang="vi-VN"/>
               <a:t>Các nội dung chính của Block</a:t>
             </a:r>
             <a:endParaRPr lang="en-US" dirty="0"/>
@@ -3170,7 +3130,7 @@
               <a:buAutoNum type="arabicPeriod"/>
             </a:pPr>
             <a:r>
-              <a:rPr lang="vi-VN" dirty="0" smtClean="0"/>
+              <a:rPr lang="vi-VN" dirty="0"/>
               <a:t>Sự cảm nhận âm thanh của con người</a:t>
             </a:r>
           </a:p>
@@ -3180,7 +3140,7 @@
               <a:buAutoNum type="arabicPeriod"/>
             </a:pPr>
             <a:r>
-              <a:rPr lang="vi-VN" dirty="0" smtClean="0"/>
+              <a:rPr lang="vi-VN" dirty="0"/>
               <a:t>Đặc tính nhạc của âm thanh</a:t>
             </a:r>
           </a:p>
@@ -3190,7 +3150,7 @@
               <a:buAutoNum type="arabicPeriod"/>
             </a:pPr>
             <a:r>
-              <a:rPr lang="vi-VN" dirty="0" smtClean="0"/>
+              <a:rPr lang="vi-VN" dirty="0"/>
               <a:t>Độ cao, độ mạnh của âm thanh</a:t>
             </a:r>
           </a:p>
@@ -3200,7 +3160,7 @@
               <a:buAutoNum type="arabicPeriod"/>
             </a:pPr>
             <a:r>
-              <a:rPr lang="vi-VN" dirty="0" smtClean="0"/>
+              <a:rPr lang="vi-VN" dirty="0"/>
               <a:t>Đặc tính cơ học của âm thanh, nguồn âm thanh. Đánh giá 3 bộ nhạc cụ và cách tạo âm thanh của chúng</a:t>
             </a:r>
           </a:p>
@@ -3210,7 +3170,7 @@
               <a:buAutoNum type="arabicPeriod"/>
             </a:pPr>
             <a:r>
-              <a:rPr lang="vi-VN" dirty="0" smtClean="0"/>
+              <a:rPr lang="vi-VN" dirty="0"/>
               <a:t>Sự ảnh hưởng của môi trường truyền âm</a:t>
             </a:r>
             <a:endParaRPr lang="en-US" dirty="0"/>
@@ -3227,13 +3187,118 @@
   <p:clrMapOvr>
     <a:masterClrMapping/>
   </p:clrMapOvr>
-  <p:timing>
-    <p:tnLst>
-      <p:par>
-        <p:cTn id="1" dur="indefinite" restart="never" nodeType="tmRoot"/>
-      </p:par>
-    </p:tnLst>
-  </p:timing>
+</p:sld>
+</file>
+
+<file path=ppt/slides/slide3.xml><?xml version="1.0" encoding="utf-8"?>
+<p:sld xmlns:a="http://schemas.openxmlformats.org/drawingml/2006/main" xmlns:r="http://schemas.openxmlformats.org/officeDocument/2006/relationships" xmlns:p="http://schemas.openxmlformats.org/presentationml/2006/main">
+  <p:cSld>
+    <p:spTree>
+      <p:nvGrpSpPr>
+        <p:cNvPr id="1" name=""/>
+        <p:cNvGrpSpPr/>
+        <p:nvPr/>
+      </p:nvGrpSpPr>
+      <p:grpSpPr>
+        <a:xfrm>
+          <a:off x="0" y="0"/>
+          <a:ext cx="0" cy="0"/>
+          <a:chOff x="0" y="0"/>
+          <a:chExt cx="0" cy="0"/>
+        </a:xfrm>
+      </p:grpSpPr>
+      <p:sp>
+        <p:nvSpPr>
+          <p:cNvPr id="2" name="Title 1">
+            <a:extLst>
+              <a:ext uri="{FF2B5EF4-FFF2-40B4-BE49-F238E27FC236}">
+                <a16:creationId xmlns:a16="http://schemas.microsoft.com/office/drawing/2014/main" id="{05AE60A1-1D60-430F-AFD0-86754C8DB9BE}"/>
+              </a:ext>
+            </a:extLst>
+          </p:cNvPr>
+          <p:cNvSpPr>
+            <a:spLocks noGrp="1"/>
+          </p:cNvSpPr>
+          <p:nvPr>
+            <p:ph type="title"/>
+          </p:nvPr>
+        </p:nvSpPr>
+        <p:spPr/>
+        <p:txBody>
+          <a:bodyPr/>
+          <a:lstStyle/>
+          <a:p>
+            <a:endParaRPr lang="en-US" dirty="0"/>
+          </a:p>
+        </p:txBody>
+      </p:sp>
+      <p:sp>
+        <p:nvSpPr>
+          <p:cNvPr id="3" name="Content Placeholder 2">
+            <a:extLst>
+              <a:ext uri="{FF2B5EF4-FFF2-40B4-BE49-F238E27FC236}">
+                <a16:creationId xmlns:a16="http://schemas.microsoft.com/office/drawing/2014/main" id="{742600E2-3E69-4C45-9ACC-99453F1AB769}"/>
+              </a:ext>
+            </a:extLst>
+          </p:cNvPr>
+          <p:cNvSpPr>
+            <a:spLocks noGrp="1"/>
+          </p:cNvSpPr>
+          <p:nvPr>
+            <p:ph idx="1"/>
+          </p:nvPr>
+        </p:nvSpPr>
+        <p:spPr/>
+        <p:txBody>
+          <a:bodyPr/>
+          <a:lstStyle/>
+          <a:p>
+            <a:r>
+              <a:rPr lang="en-US" dirty="0" err="1"/>
+              <a:t>Thời</a:t>
+            </a:r>
+            <a:r>
+              <a:rPr lang="en-US" dirty="0"/>
+              <a:t> </a:t>
+            </a:r>
+            <a:r>
+              <a:rPr lang="en-US" dirty="0" err="1"/>
+              <a:t>gian</a:t>
+            </a:r>
+            <a:r>
+              <a:rPr lang="en-US" dirty="0"/>
+              <a:t> </a:t>
+            </a:r>
+            <a:r>
+              <a:rPr lang="en-US" dirty="0" err="1"/>
+              <a:t>dự</a:t>
+            </a:r>
+            <a:r>
+              <a:rPr lang="en-US" dirty="0"/>
+              <a:t> </a:t>
+            </a:r>
+            <a:r>
+              <a:rPr lang="en-US" dirty="0" err="1"/>
+              <a:t>kiến</a:t>
+            </a:r>
+            <a:r>
+              <a:rPr lang="en-US"/>
+              <a:t>: </a:t>
+            </a:r>
+            <a:endParaRPr lang="en-US" dirty="0"/>
+          </a:p>
+        </p:txBody>
+      </p:sp>
+    </p:spTree>
+    <p:extLst>
+      <p:ext uri="{BB962C8B-B14F-4D97-AF65-F5344CB8AC3E}">
+        <p14:creationId xmlns:p14="http://schemas.microsoft.com/office/powerpoint/2010/main" val="1595655954"/>
+      </p:ext>
+    </p:extLst>
+  </p:cSld>
+  <p:clrMapOvr>
+    <a:masterClrMapping/>
+  </p:clrMapOvr>
 </p:sld>
 </file>
 

</xml_diff>

<commit_message>
Phiên bản của Thọ
Tạo nhánh mới
</commit_message>
<xml_diff>
--- a/Block_VatLy_6_AmThanh.pptx
+++ b/Block_VatLy_6_AmThanh.pptx
@@ -7,6 +7,7 @@
   <p:sldIdLst>
     <p:sldId id="256" r:id="rId2"/>
     <p:sldId id="257" r:id="rId3"/>
+    <p:sldId id="258" r:id="rId4"/>
   </p:sldIdLst>
   <p:sldSz cx="12192000" cy="6858000"/>
   <p:notesSz cx="6858000" cy="9144000"/>
@@ -244,7 +245,7 @@
           <a:p>
             <a:fld id="{659F8ED3-1E5F-4914-B9DD-FAF679EFBFC0}" type="datetimeFigureOut">
               <a:rPr lang="en-US" smtClean="0"/>
-              <a:t>4/3/2022</a:t>
+              <a:t>09-Apr-2022</a:t>
             </a:fld>
             <a:endParaRPr lang="en-US"/>
           </a:p>
@@ -414,7 +415,7 @@
           <a:p>
             <a:fld id="{659F8ED3-1E5F-4914-B9DD-FAF679EFBFC0}" type="datetimeFigureOut">
               <a:rPr lang="en-US" smtClean="0"/>
-              <a:t>4/3/2022</a:t>
+              <a:t>09-Apr-2022</a:t>
             </a:fld>
             <a:endParaRPr lang="en-US"/>
           </a:p>
@@ -594,7 +595,7 @@
           <a:p>
             <a:fld id="{659F8ED3-1E5F-4914-B9DD-FAF679EFBFC0}" type="datetimeFigureOut">
               <a:rPr lang="en-US" smtClean="0"/>
-              <a:t>4/3/2022</a:t>
+              <a:t>09-Apr-2022</a:t>
             </a:fld>
             <a:endParaRPr lang="en-US"/>
           </a:p>
@@ -764,7 +765,7 @@
           <a:p>
             <a:fld id="{659F8ED3-1E5F-4914-B9DD-FAF679EFBFC0}" type="datetimeFigureOut">
               <a:rPr lang="en-US" smtClean="0"/>
-              <a:t>4/3/2022</a:t>
+              <a:t>09-Apr-2022</a:t>
             </a:fld>
             <a:endParaRPr lang="en-US"/>
           </a:p>
@@ -1010,7 +1011,7 @@
           <a:p>
             <a:fld id="{659F8ED3-1E5F-4914-B9DD-FAF679EFBFC0}" type="datetimeFigureOut">
               <a:rPr lang="en-US" smtClean="0"/>
-              <a:t>4/3/2022</a:t>
+              <a:t>09-Apr-2022</a:t>
             </a:fld>
             <a:endParaRPr lang="en-US"/>
           </a:p>
@@ -1242,7 +1243,7 @@
           <a:p>
             <a:fld id="{659F8ED3-1E5F-4914-B9DD-FAF679EFBFC0}" type="datetimeFigureOut">
               <a:rPr lang="en-US" smtClean="0"/>
-              <a:t>4/3/2022</a:t>
+              <a:t>09-Apr-2022</a:t>
             </a:fld>
             <a:endParaRPr lang="en-US"/>
           </a:p>
@@ -1609,7 +1610,7 @@
           <a:p>
             <a:fld id="{659F8ED3-1E5F-4914-B9DD-FAF679EFBFC0}" type="datetimeFigureOut">
               <a:rPr lang="en-US" smtClean="0"/>
-              <a:t>4/3/2022</a:t>
+              <a:t>09-Apr-2022</a:t>
             </a:fld>
             <a:endParaRPr lang="en-US"/>
           </a:p>
@@ -1727,7 +1728,7 @@
           <a:p>
             <a:fld id="{659F8ED3-1E5F-4914-B9DD-FAF679EFBFC0}" type="datetimeFigureOut">
               <a:rPr lang="en-US" smtClean="0"/>
-              <a:t>4/3/2022</a:t>
+              <a:t>09-Apr-2022</a:t>
             </a:fld>
             <a:endParaRPr lang="en-US"/>
           </a:p>
@@ -1822,7 +1823,7 @@
           <a:p>
             <a:fld id="{659F8ED3-1E5F-4914-B9DD-FAF679EFBFC0}" type="datetimeFigureOut">
               <a:rPr lang="en-US" smtClean="0"/>
-              <a:t>4/3/2022</a:t>
+              <a:t>09-Apr-2022</a:t>
             </a:fld>
             <a:endParaRPr lang="en-US"/>
           </a:p>
@@ -2099,7 +2100,7 @@
           <a:p>
             <a:fld id="{659F8ED3-1E5F-4914-B9DD-FAF679EFBFC0}" type="datetimeFigureOut">
               <a:rPr lang="en-US" smtClean="0"/>
-              <a:t>4/3/2022</a:t>
+              <a:t>09-Apr-2022</a:t>
             </a:fld>
             <a:endParaRPr lang="en-US"/>
           </a:p>
@@ -2352,7 +2353,7 @@
           <a:p>
             <a:fld id="{659F8ED3-1E5F-4914-B9DD-FAF679EFBFC0}" type="datetimeFigureOut">
               <a:rPr lang="en-US" smtClean="0"/>
-              <a:t>4/3/2022</a:t>
+              <a:t>09-Apr-2022</a:t>
             </a:fld>
             <a:endParaRPr lang="en-US"/>
           </a:p>
@@ -2565,7 +2566,7 @@
           <a:p>
             <a:fld id="{659F8ED3-1E5F-4914-B9DD-FAF679EFBFC0}" type="datetimeFigureOut">
               <a:rPr lang="en-US" smtClean="0"/>
-              <a:t>4/3/2022</a:t>
+              <a:t>09-Apr-2022</a:t>
             </a:fld>
             <a:endParaRPr lang="en-US"/>
           </a:p>
@@ -3046,25 +3047,12 @@
               </a:rPr>
               <a:t>Thầy Lê Thọ</a:t>
             </a:r>
-            <a:endParaRPr lang="vi-VN" b="1" dirty="0" smtClean="0">
-              <a:solidFill>
-                <a:srgbClr val="FF0000"/>
-              </a:solidFill>
-            </a:endParaRPr>
           </a:p>
           <a:p>
             <a:pPr algn="just"/>
             <a:r>
               <a:rPr lang="vi-VN" dirty="0" smtClean="0"/>
-              <a:t>Cung </a:t>
-            </a:r>
-            <a:r>
-              <a:rPr lang="vi-VN" dirty="0" smtClean="0"/>
-              <a:t>cấp các kiến thức sơ khởi về âm </a:t>
-            </a:r>
-            <a:r>
-              <a:rPr lang="vi-VN" dirty="0" smtClean="0"/>
-              <a:t>học</a:t>
+              <a:t>Cung cấp các kiến thức sơ khởi về âm học</a:t>
             </a:r>
             <a:r>
               <a:rPr lang="en-US" dirty="0" smtClean="0"/>
@@ -3234,6 +3222,78 @@
       </p:par>
     </p:tnLst>
   </p:timing>
+</p:sld>
+</file>
+
+<file path=ppt/slides/slide3.xml><?xml version="1.0" encoding="utf-8"?>
+<p:sld xmlns:a="http://schemas.openxmlformats.org/drawingml/2006/main" xmlns:r="http://schemas.openxmlformats.org/officeDocument/2006/relationships" xmlns:p="http://schemas.openxmlformats.org/presentationml/2006/main">
+  <p:cSld>
+    <p:spTree>
+      <p:nvGrpSpPr>
+        <p:cNvPr id="1" name=""/>
+        <p:cNvGrpSpPr/>
+        <p:nvPr/>
+      </p:nvGrpSpPr>
+      <p:grpSpPr>
+        <a:xfrm>
+          <a:off x="0" y="0"/>
+          <a:ext cx="0" cy="0"/>
+          <a:chOff x="0" y="0"/>
+          <a:chExt cx="0" cy="0"/>
+        </a:xfrm>
+      </p:grpSpPr>
+      <p:sp>
+        <p:nvSpPr>
+          <p:cNvPr id="2" name="Title 1"/>
+          <p:cNvSpPr>
+            <a:spLocks noGrp="1"/>
+          </p:cNvSpPr>
+          <p:nvPr>
+            <p:ph type="title"/>
+          </p:nvPr>
+        </p:nvSpPr>
+        <p:spPr/>
+        <p:txBody>
+          <a:bodyPr/>
+          <a:lstStyle/>
+          <a:p>
+            <a:r>
+              <a:rPr lang="vi-VN" smtClean="0"/>
+              <a:t>Bài học 1:</a:t>
+            </a:r>
+            <a:endParaRPr lang="en-US"/>
+          </a:p>
+        </p:txBody>
+      </p:sp>
+      <p:sp>
+        <p:nvSpPr>
+          <p:cNvPr id="3" name="Content Placeholder 2"/>
+          <p:cNvSpPr>
+            <a:spLocks noGrp="1"/>
+          </p:cNvSpPr>
+          <p:nvPr>
+            <p:ph idx="1"/>
+          </p:nvPr>
+        </p:nvSpPr>
+        <p:spPr/>
+        <p:txBody>
+          <a:bodyPr/>
+          <a:lstStyle/>
+          <a:p>
+            <a:endParaRPr lang="en-US"/>
+          </a:p>
+        </p:txBody>
+      </p:sp>
+    </p:spTree>
+    <p:extLst>
+      <p:ext uri="{BB962C8B-B14F-4D97-AF65-F5344CB8AC3E}">
+        <p14:creationId xmlns:p14="http://schemas.microsoft.com/office/powerpoint/2010/main" val="1497003611"/>
+      </p:ext>
+    </p:extLst>
+  </p:cSld>
+  <p:clrMapOvr>
+    <a:masterClrMapping/>
+  </p:clrMapOvr>
 </p:sld>
 </file>
 

</xml_diff>

<commit_message>
Hai anh bo sung ngay 9/4
them khung chuong trinh
</commit_message>
<xml_diff>
--- a/Block_VatLy_6_AmThanh.pptx
+++ b/Block_VatLy_6_AmThanh.pptx
@@ -3228,7 +3228,10 @@
           <a:bodyPr/>
           <a:lstStyle/>
           <a:p>
-            <a:endParaRPr lang="en-US" dirty="0"/>
+            <a:r>
+              <a:rPr lang="en-US" dirty="0"/>
+              <a:t>Bai 1 </a:t>
+            </a:r>
           </a:p>
         </p:txBody>
       </p:sp>
@@ -3282,9 +3285,40 @@
               <a:t>kiến</a:t>
             </a:r>
             <a:r>
-              <a:rPr lang="en-US"/>
+              <a:rPr lang="en-US" dirty="0"/>
               <a:t>: </a:t>
             </a:r>
+          </a:p>
+          <a:p>
+            <a:r>
+              <a:rPr lang="en-US" dirty="0"/>
+              <a:t>Trat </a:t>
+            </a:r>
+            <a:r>
+              <a:rPr lang="en-US" dirty="0" err="1"/>
+              <a:t>tu</a:t>
+            </a:r>
+            <a:r>
+              <a:rPr lang="en-US" dirty="0"/>
+              <a:t> bai </a:t>
+            </a:r>
+            <a:r>
+              <a:rPr lang="en-US" dirty="0" err="1"/>
+              <a:t>giang</a:t>
+            </a:r>
+            <a:endParaRPr lang="en-US" dirty="0"/>
+          </a:p>
+          <a:p>
+            <a:r>
+              <a:rPr lang="en-US" dirty="0" err="1"/>
+              <a:t>Thi</a:t>
+            </a:r>
+            <a:r>
+              <a:rPr lang="en-US"/>
+              <a:t> Nghiem </a:t>
+            </a:r>
+          </a:p>
+          <a:p>
             <a:endParaRPr lang="en-US" dirty="0"/>
           </a:p>
         </p:txBody>

</xml_diff>

<commit_message>
Phân bổ theo ngày
Trao đổi với Thọ về phân bổ nội dung "âm thanh"
</commit_message>
<xml_diff>
--- a/Block_VatLy_6_AmThanh.pptx
+++ b/Block_VatLy_6_AmThanh.pptx
@@ -4,6 +4,9 @@
   <p:sldMasterIdLst>
     <p:sldMasterId id="2147483648" r:id="rId1"/>
   </p:sldMasterIdLst>
+  <p:notesMasterIdLst>
+    <p:notesMasterId r:id="rId5"/>
+  </p:notesMasterIdLst>
   <p:sldIdLst>
     <p:sldId id="256" r:id="rId2"/>
     <p:sldId id="257" r:id="rId3"/>
@@ -112,6 +115,439 @@
     </p:ext>
   </p:extLst>
 </p:presentation>
+</file>
+
+<file path=ppt/notesMasters/notesMaster1.xml><?xml version="1.0" encoding="utf-8"?>
+<p:notesMaster xmlns:a="http://schemas.openxmlformats.org/drawingml/2006/main" xmlns:r="http://schemas.openxmlformats.org/officeDocument/2006/relationships" xmlns:p="http://schemas.openxmlformats.org/presentationml/2006/main">
+  <p:cSld>
+    <p:bg>
+      <p:bgRef idx="1001">
+        <a:schemeClr val="bg1"/>
+      </p:bgRef>
+    </p:bg>
+    <p:spTree>
+      <p:nvGrpSpPr>
+        <p:cNvPr id="1" name=""/>
+        <p:cNvGrpSpPr/>
+        <p:nvPr/>
+      </p:nvGrpSpPr>
+      <p:grpSpPr>
+        <a:xfrm>
+          <a:off x="0" y="0"/>
+          <a:ext cx="0" cy="0"/>
+          <a:chOff x="0" y="0"/>
+          <a:chExt cx="0" cy="0"/>
+        </a:xfrm>
+      </p:grpSpPr>
+      <p:sp>
+        <p:nvSpPr>
+          <p:cNvPr id="2" name="Header Placeholder 1"/>
+          <p:cNvSpPr>
+            <a:spLocks noGrp="1"/>
+          </p:cNvSpPr>
+          <p:nvPr>
+            <p:ph type="hdr" sz="quarter"/>
+          </p:nvPr>
+        </p:nvSpPr>
+        <p:spPr>
+          <a:xfrm>
+            <a:off x="0" y="0"/>
+            <a:ext cx="2971800" cy="458788"/>
+          </a:xfrm>
+          <a:prstGeom prst="rect">
+            <a:avLst/>
+          </a:prstGeom>
+        </p:spPr>
+        <p:txBody>
+          <a:bodyPr vert="horz" lIns="91440" tIns="45720" rIns="91440" bIns="45720" rtlCol="0"/>
+          <a:lstStyle>
+            <a:lvl1pPr algn="l">
+              <a:defRPr sz="1200"/>
+            </a:lvl1pPr>
+          </a:lstStyle>
+          <a:p>
+            <a:endParaRPr lang="en-US"/>
+          </a:p>
+        </p:txBody>
+      </p:sp>
+      <p:sp>
+        <p:nvSpPr>
+          <p:cNvPr id="3" name="Date Placeholder 2"/>
+          <p:cNvSpPr>
+            <a:spLocks noGrp="1"/>
+          </p:cNvSpPr>
+          <p:nvPr>
+            <p:ph type="dt" idx="1"/>
+          </p:nvPr>
+        </p:nvSpPr>
+        <p:spPr>
+          <a:xfrm>
+            <a:off x="3884613" y="0"/>
+            <a:ext cx="2971800" cy="458788"/>
+          </a:xfrm>
+          <a:prstGeom prst="rect">
+            <a:avLst/>
+          </a:prstGeom>
+        </p:spPr>
+        <p:txBody>
+          <a:bodyPr vert="horz" lIns="91440" tIns="45720" rIns="91440" bIns="45720" rtlCol="0"/>
+          <a:lstStyle>
+            <a:lvl1pPr algn="r">
+              <a:defRPr sz="1200"/>
+            </a:lvl1pPr>
+          </a:lstStyle>
+          <a:p>
+            <a:fld id="{C6B78A61-2B8F-4648-B33A-33E1622C6562}" type="datetimeFigureOut">
+              <a:rPr lang="en-US" smtClean="0"/>
+              <a:t>4/9/2022</a:t>
+            </a:fld>
+            <a:endParaRPr lang="en-US"/>
+          </a:p>
+        </p:txBody>
+      </p:sp>
+      <p:sp>
+        <p:nvSpPr>
+          <p:cNvPr id="4" name="Slide Image Placeholder 3"/>
+          <p:cNvSpPr>
+            <a:spLocks noGrp="1" noRot="1" noChangeAspect="1"/>
+          </p:cNvSpPr>
+          <p:nvPr>
+            <p:ph type="sldImg" idx="2"/>
+          </p:nvPr>
+        </p:nvSpPr>
+        <p:spPr>
+          <a:xfrm>
+            <a:off x="685800" y="1143000"/>
+            <a:ext cx="5486400" cy="3086100"/>
+          </a:xfrm>
+          <a:prstGeom prst="rect">
+            <a:avLst/>
+          </a:prstGeom>
+          <a:noFill/>
+          <a:ln w="12700">
+            <a:solidFill>
+              <a:prstClr val="black"/>
+            </a:solidFill>
+          </a:ln>
+        </p:spPr>
+        <p:txBody>
+          <a:bodyPr vert="horz" lIns="91440" tIns="45720" rIns="91440" bIns="45720" rtlCol="0" anchor="ctr"/>
+          <a:lstStyle/>
+          <a:p>
+            <a:endParaRPr lang="en-US"/>
+          </a:p>
+        </p:txBody>
+      </p:sp>
+      <p:sp>
+        <p:nvSpPr>
+          <p:cNvPr id="5" name="Notes Placeholder 4"/>
+          <p:cNvSpPr>
+            <a:spLocks noGrp="1"/>
+          </p:cNvSpPr>
+          <p:nvPr>
+            <p:ph type="body" sz="quarter" idx="3"/>
+          </p:nvPr>
+        </p:nvSpPr>
+        <p:spPr>
+          <a:xfrm>
+            <a:off x="685800" y="4400550"/>
+            <a:ext cx="5486400" cy="3600450"/>
+          </a:xfrm>
+          <a:prstGeom prst="rect">
+            <a:avLst/>
+          </a:prstGeom>
+        </p:spPr>
+        <p:txBody>
+          <a:bodyPr vert="horz" lIns="91440" tIns="45720" rIns="91440" bIns="45720" rtlCol="0"/>
+          <a:lstStyle/>
+          <a:p>
+            <a:pPr lvl="0"/>
+            <a:r>
+              <a:rPr lang="en-US"/>
+              <a:t>Click to edit Master text styles</a:t>
+            </a:r>
+          </a:p>
+          <a:p>
+            <a:pPr lvl="1"/>
+            <a:r>
+              <a:rPr lang="en-US"/>
+              <a:t>Second level</a:t>
+            </a:r>
+          </a:p>
+          <a:p>
+            <a:pPr lvl="2"/>
+            <a:r>
+              <a:rPr lang="en-US"/>
+              <a:t>Third level</a:t>
+            </a:r>
+          </a:p>
+          <a:p>
+            <a:pPr lvl="3"/>
+            <a:r>
+              <a:rPr lang="en-US"/>
+              <a:t>Fourth level</a:t>
+            </a:r>
+          </a:p>
+          <a:p>
+            <a:pPr lvl="4"/>
+            <a:r>
+              <a:rPr lang="en-US"/>
+              <a:t>Fifth level</a:t>
+            </a:r>
+          </a:p>
+        </p:txBody>
+      </p:sp>
+      <p:sp>
+        <p:nvSpPr>
+          <p:cNvPr id="6" name="Footer Placeholder 5"/>
+          <p:cNvSpPr>
+            <a:spLocks noGrp="1"/>
+          </p:cNvSpPr>
+          <p:nvPr>
+            <p:ph type="ftr" sz="quarter" idx="4"/>
+          </p:nvPr>
+        </p:nvSpPr>
+        <p:spPr>
+          <a:xfrm>
+            <a:off x="0" y="8685213"/>
+            <a:ext cx="2971800" cy="458787"/>
+          </a:xfrm>
+          <a:prstGeom prst="rect">
+            <a:avLst/>
+          </a:prstGeom>
+        </p:spPr>
+        <p:txBody>
+          <a:bodyPr vert="horz" lIns="91440" tIns="45720" rIns="91440" bIns="45720" rtlCol="0" anchor="b"/>
+          <a:lstStyle>
+            <a:lvl1pPr algn="l">
+              <a:defRPr sz="1200"/>
+            </a:lvl1pPr>
+          </a:lstStyle>
+          <a:p>
+            <a:endParaRPr lang="en-US"/>
+          </a:p>
+        </p:txBody>
+      </p:sp>
+      <p:sp>
+        <p:nvSpPr>
+          <p:cNvPr id="7" name="Slide Number Placeholder 6"/>
+          <p:cNvSpPr>
+            <a:spLocks noGrp="1"/>
+          </p:cNvSpPr>
+          <p:nvPr>
+            <p:ph type="sldNum" sz="quarter" idx="5"/>
+          </p:nvPr>
+        </p:nvSpPr>
+        <p:spPr>
+          <a:xfrm>
+            <a:off x="3884613" y="8685213"/>
+            <a:ext cx="2971800" cy="458787"/>
+          </a:xfrm>
+          <a:prstGeom prst="rect">
+            <a:avLst/>
+          </a:prstGeom>
+        </p:spPr>
+        <p:txBody>
+          <a:bodyPr vert="horz" lIns="91440" tIns="45720" rIns="91440" bIns="45720" rtlCol="0" anchor="b"/>
+          <a:lstStyle>
+            <a:lvl1pPr algn="r">
+              <a:defRPr sz="1200"/>
+            </a:lvl1pPr>
+          </a:lstStyle>
+          <a:p>
+            <a:fld id="{9EFA8A86-600F-4A9D-A210-0EDB566EBDFD}" type="slidenum">
+              <a:rPr lang="en-US" smtClean="0"/>
+              <a:t>‹#›</a:t>
+            </a:fld>
+            <a:endParaRPr lang="en-US"/>
+          </a:p>
+        </p:txBody>
+      </p:sp>
+    </p:spTree>
+    <p:extLst>
+      <p:ext uri="{BB962C8B-B14F-4D97-AF65-F5344CB8AC3E}">
+        <p14:creationId xmlns:p14="http://schemas.microsoft.com/office/powerpoint/2010/main" val="4207012616"/>
+      </p:ext>
+    </p:extLst>
+  </p:cSld>
+  <p:clrMap bg1="lt1" tx1="dk1" bg2="lt2" tx2="dk2" accent1="accent1" accent2="accent2" accent3="accent3" accent4="accent4" accent5="accent5" accent6="accent6" hlink="hlink" folHlink="folHlink"/>
+  <p:notesStyle>
+    <a:lvl1pPr marL="0" algn="l" defTabSz="914400" rtl="0" eaLnBrk="1" latinLnBrk="0" hangingPunct="1">
+      <a:defRPr sz="1200" kern="1200">
+        <a:solidFill>
+          <a:schemeClr val="tx1"/>
+        </a:solidFill>
+        <a:latin typeface="+mn-lt"/>
+        <a:ea typeface="+mn-ea"/>
+        <a:cs typeface="+mn-cs"/>
+      </a:defRPr>
+    </a:lvl1pPr>
+    <a:lvl2pPr marL="457200" algn="l" defTabSz="914400" rtl="0" eaLnBrk="1" latinLnBrk="0" hangingPunct="1">
+      <a:defRPr sz="1200" kern="1200">
+        <a:solidFill>
+          <a:schemeClr val="tx1"/>
+        </a:solidFill>
+        <a:latin typeface="+mn-lt"/>
+        <a:ea typeface="+mn-ea"/>
+        <a:cs typeface="+mn-cs"/>
+      </a:defRPr>
+    </a:lvl2pPr>
+    <a:lvl3pPr marL="914400" algn="l" defTabSz="914400" rtl="0" eaLnBrk="1" latinLnBrk="0" hangingPunct="1">
+      <a:defRPr sz="1200" kern="1200">
+        <a:solidFill>
+          <a:schemeClr val="tx1"/>
+        </a:solidFill>
+        <a:latin typeface="+mn-lt"/>
+        <a:ea typeface="+mn-ea"/>
+        <a:cs typeface="+mn-cs"/>
+      </a:defRPr>
+    </a:lvl3pPr>
+    <a:lvl4pPr marL="1371600" algn="l" defTabSz="914400" rtl="0" eaLnBrk="1" latinLnBrk="0" hangingPunct="1">
+      <a:defRPr sz="1200" kern="1200">
+        <a:solidFill>
+          <a:schemeClr val="tx1"/>
+        </a:solidFill>
+        <a:latin typeface="+mn-lt"/>
+        <a:ea typeface="+mn-ea"/>
+        <a:cs typeface="+mn-cs"/>
+      </a:defRPr>
+    </a:lvl4pPr>
+    <a:lvl5pPr marL="1828800" algn="l" defTabSz="914400" rtl="0" eaLnBrk="1" latinLnBrk="0" hangingPunct="1">
+      <a:defRPr sz="1200" kern="1200">
+        <a:solidFill>
+          <a:schemeClr val="tx1"/>
+        </a:solidFill>
+        <a:latin typeface="+mn-lt"/>
+        <a:ea typeface="+mn-ea"/>
+        <a:cs typeface="+mn-cs"/>
+      </a:defRPr>
+    </a:lvl5pPr>
+    <a:lvl6pPr marL="2286000" algn="l" defTabSz="914400" rtl="0" eaLnBrk="1" latinLnBrk="0" hangingPunct="1">
+      <a:defRPr sz="1200" kern="1200">
+        <a:solidFill>
+          <a:schemeClr val="tx1"/>
+        </a:solidFill>
+        <a:latin typeface="+mn-lt"/>
+        <a:ea typeface="+mn-ea"/>
+        <a:cs typeface="+mn-cs"/>
+      </a:defRPr>
+    </a:lvl6pPr>
+    <a:lvl7pPr marL="2743200" algn="l" defTabSz="914400" rtl="0" eaLnBrk="1" latinLnBrk="0" hangingPunct="1">
+      <a:defRPr sz="1200" kern="1200">
+        <a:solidFill>
+          <a:schemeClr val="tx1"/>
+        </a:solidFill>
+        <a:latin typeface="+mn-lt"/>
+        <a:ea typeface="+mn-ea"/>
+        <a:cs typeface="+mn-cs"/>
+      </a:defRPr>
+    </a:lvl7pPr>
+    <a:lvl8pPr marL="3200400" algn="l" defTabSz="914400" rtl="0" eaLnBrk="1" latinLnBrk="0" hangingPunct="1">
+      <a:defRPr sz="1200" kern="1200">
+        <a:solidFill>
+          <a:schemeClr val="tx1"/>
+        </a:solidFill>
+        <a:latin typeface="+mn-lt"/>
+        <a:ea typeface="+mn-ea"/>
+        <a:cs typeface="+mn-cs"/>
+      </a:defRPr>
+    </a:lvl8pPr>
+    <a:lvl9pPr marL="3657600" algn="l" defTabSz="914400" rtl="0" eaLnBrk="1" latinLnBrk="0" hangingPunct="1">
+      <a:defRPr sz="1200" kern="1200">
+        <a:solidFill>
+          <a:schemeClr val="tx1"/>
+        </a:solidFill>
+        <a:latin typeface="+mn-lt"/>
+        <a:ea typeface="+mn-ea"/>
+        <a:cs typeface="+mn-cs"/>
+      </a:defRPr>
+    </a:lvl9pPr>
+  </p:notesStyle>
+</p:notesMaster>
+</file>
+
+<file path=ppt/notesSlides/notesSlide1.xml><?xml version="1.0" encoding="utf-8"?>
+<p:notes xmlns:a="http://schemas.openxmlformats.org/drawingml/2006/main" xmlns:r="http://schemas.openxmlformats.org/officeDocument/2006/relationships" xmlns:p="http://schemas.openxmlformats.org/presentationml/2006/main">
+  <p:cSld>
+    <p:spTree>
+      <p:nvGrpSpPr>
+        <p:cNvPr id="1" name=""/>
+        <p:cNvGrpSpPr/>
+        <p:nvPr/>
+      </p:nvGrpSpPr>
+      <p:grpSpPr>
+        <a:xfrm>
+          <a:off x="0" y="0"/>
+          <a:ext cx="0" cy="0"/>
+          <a:chOff x="0" y="0"/>
+          <a:chExt cx="0" cy="0"/>
+        </a:xfrm>
+      </p:grpSpPr>
+      <p:sp>
+        <p:nvSpPr>
+          <p:cNvPr id="2" name="Slide Image Placeholder 1"/>
+          <p:cNvSpPr>
+            <a:spLocks noGrp="1" noRot="1" noChangeAspect="1"/>
+          </p:cNvSpPr>
+          <p:nvPr>
+            <p:ph type="sldImg"/>
+          </p:nvPr>
+        </p:nvSpPr>
+        <p:spPr/>
+      </p:sp>
+      <p:sp>
+        <p:nvSpPr>
+          <p:cNvPr id="3" name="Notes Placeholder 2"/>
+          <p:cNvSpPr>
+            <a:spLocks noGrp="1"/>
+          </p:cNvSpPr>
+          <p:nvPr>
+            <p:ph type="body" idx="1"/>
+          </p:nvPr>
+        </p:nvSpPr>
+        <p:spPr/>
+        <p:txBody>
+          <a:bodyPr/>
+          <a:lstStyle/>
+          <a:p>
+            <a:endParaRPr lang="en-US" dirty="0"/>
+          </a:p>
+        </p:txBody>
+      </p:sp>
+      <p:sp>
+        <p:nvSpPr>
+          <p:cNvPr id="4" name="Slide Number Placeholder 3"/>
+          <p:cNvSpPr>
+            <a:spLocks noGrp="1"/>
+          </p:cNvSpPr>
+          <p:nvPr>
+            <p:ph type="sldNum" sz="quarter" idx="5"/>
+          </p:nvPr>
+        </p:nvSpPr>
+        <p:spPr/>
+        <p:txBody>
+          <a:bodyPr/>
+          <a:lstStyle/>
+          <a:p>
+            <a:fld id="{9EFA8A86-600F-4A9D-A210-0EDB566EBDFD}" type="slidenum">
+              <a:rPr lang="en-US" smtClean="0"/>
+              <a:t>3</a:t>
+            </a:fld>
+            <a:endParaRPr lang="en-US"/>
+          </a:p>
+        </p:txBody>
+      </p:sp>
+    </p:spTree>
+    <p:extLst>
+      <p:ext uri="{BB962C8B-B14F-4D97-AF65-F5344CB8AC3E}">
+        <p14:creationId xmlns:p14="http://schemas.microsoft.com/office/powerpoint/2010/main" val="2330446329"/>
+      </p:ext>
+    </p:extLst>
+  </p:cSld>
+  <p:clrMapOvr>
+    <a:masterClrMapping/>
+  </p:clrMapOvr>
+</p:notes>
 </file>
 
 <file path=ppt/slideLayouts/slideLayout1.xml><?xml version="1.0" encoding="utf-8"?>
@@ -3207,122 +3643,1703 @@
           <a:chExt cx="0" cy="0"/>
         </a:xfrm>
       </p:grpSpPr>
-      <p:sp>
-        <p:nvSpPr>
-          <p:cNvPr id="2" name="Title 1">
+      <p:graphicFrame>
+        <p:nvGraphicFramePr>
+          <p:cNvPr id="4" name="Table 4">
             <a:extLst>
               <a:ext uri="{FF2B5EF4-FFF2-40B4-BE49-F238E27FC236}">
-                <a16:creationId xmlns:a16="http://schemas.microsoft.com/office/drawing/2014/main" id="{05AE60A1-1D60-430F-AFD0-86754C8DB9BE}"/>
+                <a16:creationId xmlns:a16="http://schemas.microsoft.com/office/drawing/2014/main" id="{B7E8165B-8DCD-4BBE-9207-7B76E8F332A9}"/>
               </a:ext>
             </a:extLst>
           </p:cNvPr>
-          <p:cNvSpPr>
-            <a:spLocks noGrp="1"/>
-          </p:cNvSpPr>
-          <p:nvPr>
-            <p:ph type="title"/>
-          </p:nvPr>
-        </p:nvSpPr>
-        <p:spPr/>
-        <p:txBody>
-          <a:bodyPr/>
-          <a:lstStyle/>
-          <a:p>
-            <a:r>
-              <a:rPr lang="en-US" dirty="0"/>
-              <a:t>Bai 1 </a:t>
-            </a:r>
-          </a:p>
-        </p:txBody>
-      </p:sp>
-      <p:sp>
-        <p:nvSpPr>
-          <p:cNvPr id="3" name="Content Placeholder 2">
-            <a:extLst>
-              <a:ext uri="{FF2B5EF4-FFF2-40B4-BE49-F238E27FC236}">
-                <a16:creationId xmlns:a16="http://schemas.microsoft.com/office/drawing/2014/main" id="{742600E2-3E69-4C45-9ACC-99453F1AB769}"/>
-              </a:ext>
-            </a:extLst>
-          </p:cNvPr>
-          <p:cNvSpPr>
-            <a:spLocks noGrp="1"/>
-          </p:cNvSpPr>
-          <p:nvPr>
-            <p:ph idx="1"/>
-          </p:nvPr>
-        </p:nvSpPr>
-        <p:spPr/>
-        <p:txBody>
-          <a:bodyPr/>
-          <a:lstStyle/>
-          <a:p>
-            <a:r>
-              <a:rPr lang="en-US" dirty="0" err="1"/>
-              <a:t>Thời</a:t>
-            </a:r>
-            <a:r>
-              <a:rPr lang="en-US" dirty="0"/>
-              <a:t> </a:t>
-            </a:r>
-            <a:r>
-              <a:rPr lang="en-US" dirty="0" err="1"/>
-              <a:t>gian</a:t>
-            </a:r>
-            <a:r>
-              <a:rPr lang="en-US" dirty="0"/>
-              <a:t> </a:t>
-            </a:r>
-            <a:r>
-              <a:rPr lang="en-US" dirty="0" err="1"/>
-              <a:t>dự</a:t>
-            </a:r>
-            <a:r>
-              <a:rPr lang="en-US" dirty="0"/>
-              <a:t> </a:t>
-            </a:r>
-            <a:r>
-              <a:rPr lang="en-US" dirty="0" err="1"/>
-              <a:t>kiến</a:t>
-            </a:r>
-            <a:r>
-              <a:rPr lang="en-US" dirty="0"/>
-              <a:t>: </a:t>
-            </a:r>
-          </a:p>
-          <a:p>
-            <a:r>
-              <a:rPr lang="en-US" dirty="0"/>
-              <a:t>Trat </a:t>
-            </a:r>
-            <a:r>
-              <a:rPr lang="en-US" dirty="0" err="1"/>
-              <a:t>tu</a:t>
-            </a:r>
-            <a:r>
-              <a:rPr lang="en-US" dirty="0"/>
-              <a:t> bai </a:t>
-            </a:r>
-            <a:r>
-              <a:rPr lang="en-US" dirty="0" err="1"/>
-              <a:t>giang</a:t>
-            </a:r>
-            <a:endParaRPr lang="en-US" dirty="0"/>
-          </a:p>
-          <a:p>
-            <a:r>
-              <a:rPr lang="en-US" dirty="0" err="1"/>
-              <a:t>Thi</a:t>
-            </a:r>
-            <a:r>
-              <a:rPr lang="en-US"/>
-              <a:t> Nghiem </a:t>
-            </a:r>
-          </a:p>
-          <a:p>
-            <a:endParaRPr lang="en-US" dirty="0"/>
-          </a:p>
-        </p:txBody>
-      </p:sp>
+          <p:cNvGraphicFramePr>
+            <a:graphicFrameLocks noGrp="1"/>
+          </p:cNvGraphicFramePr>
+          <p:nvPr>
+            <p:extLst>
+              <p:ext uri="{D42A27DB-BD31-4B8C-83A1-F6EECF244321}">
+                <p14:modId xmlns:p14="http://schemas.microsoft.com/office/powerpoint/2010/main" val="1299185824"/>
+              </p:ext>
+            </p:extLst>
+          </p:nvPr>
+        </p:nvGraphicFramePr>
+        <p:xfrm>
+          <a:off x="641928" y="352583"/>
+          <a:ext cx="10908144" cy="6161752"/>
+        </p:xfrm>
+        <a:graphic>
+          <a:graphicData uri="http://schemas.openxmlformats.org/drawingml/2006/table">
+            <a:tbl>
+              <a:tblPr firstRow="1" bandRow="1">
+                <a:tableStyleId>{5C22544A-7EE6-4342-B048-85BDC9FD1C3A}</a:tableStyleId>
+              </a:tblPr>
+              <a:tblGrid>
+                <a:gridCol w="3089563">
+                  <a:extLst>
+                    <a:ext uri="{9D8B030D-6E8A-4147-A177-3AD203B41FA5}">
+                      <a16:colId xmlns:a16="http://schemas.microsoft.com/office/drawing/2014/main" val="3136219253"/>
+                    </a:ext>
+                  </a:extLst>
+                </a:gridCol>
+                <a:gridCol w="4182533">
+                  <a:extLst>
+                    <a:ext uri="{9D8B030D-6E8A-4147-A177-3AD203B41FA5}">
+                      <a16:colId xmlns:a16="http://schemas.microsoft.com/office/drawing/2014/main" val="1546420850"/>
+                    </a:ext>
+                  </a:extLst>
+                </a:gridCol>
+                <a:gridCol w="3636048">
+                  <a:extLst>
+                    <a:ext uri="{9D8B030D-6E8A-4147-A177-3AD203B41FA5}">
+                      <a16:colId xmlns:a16="http://schemas.microsoft.com/office/drawing/2014/main" val="246926997"/>
+                    </a:ext>
+                  </a:extLst>
+                </a:gridCol>
+              </a:tblGrid>
+              <a:tr h="510308">
+                <a:tc gridSpan="3">
+                  <a:txBody>
+                    <a:bodyPr/>
+                    <a:lstStyle/>
+                    <a:p>
+                      <a:pPr marL="0" marR="0" lvl="0" indent="0" algn="l" defTabSz="914400" rtl="0" eaLnBrk="1" fontAlgn="auto" latinLnBrk="0" hangingPunct="1">
+                        <a:lnSpc>
+                          <a:spcPct val="100000"/>
+                        </a:lnSpc>
+                        <a:spcBef>
+                          <a:spcPts val="0"/>
+                        </a:spcBef>
+                        <a:spcAft>
+                          <a:spcPts val="0"/>
+                        </a:spcAft>
+                        <a:buClrTx/>
+                        <a:buSzTx/>
+                        <a:buFontTx/>
+                        <a:buNone/>
+                        <a:tabLst/>
+                        <a:defRPr/>
+                      </a:pPr>
+                      <a:r>
+                        <a:rPr lang="en-US" dirty="0" err="1"/>
+                        <a:t>Phân</a:t>
+                      </a:r>
+                      <a:r>
+                        <a:rPr lang="en-US" dirty="0"/>
+                        <a:t> </a:t>
+                      </a:r>
+                      <a:r>
+                        <a:rPr lang="en-US" dirty="0" err="1"/>
+                        <a:t>bổ</a:t>
+                      </a:r>
+                      <a:r>
+                        <a:rPr lang="en-US" dirty="0"/>
+                        <a:t> </a:t>
+                      </a:r>
+                      <a:r>
+                        <a:rPr lang="en-US" dirty="0" err="1"/>
+                        <a:t>chương</a:t>
+                      </a:r>
+                      <a:r>
+                        <a:rPr lang="en-US" dirty="0"/>
+                        <a:t> </a:t>
+                      </a:r>
+                      <a:r>
+                        <a:rPr lang="en-US" dirty="0" err="1"/>
+                        <a:t>trình</a:t>
+                      </a:r>
+                      <a:r>
+                        <a:rPr lang="en-US" dirty="0"/>
+                        <a:t> (</a:t>
+                      </a:r>
+                      <a:r>
+                        <a:rPr lang="en-US" dirty="0" err="1"/>
+                        <a:t>dự</a:t>
+                      </a:r>
+                      <a:r>
+                        <a:rPr lang="en-US" dirty="0"/>
+                        <a:t> </a:t>
+                      </a:r>
+                      <a:r>
+                        <a:rPr lang="en-US" dirty="0" err="1"/>
+                        <a:t>kiến</a:t>
+                      </a:r>
+                      <a:r>
+                        <a:rPr lang="en-US" dirty="0"/>
+                        <a:t>)</a:t>
+                      </a:r>
+                    </a:p>
+                  </a:txBody>
+                  <a:tcPr/>
+                </a:tc>
+                <a:tc hMerge="1">
+                  <a:txBody>
+                    <a:bodyPr/>
+                    <a:lstStyle/>
+                    <a:p>
+                      <a:endParaRPr lang="en-US" dirty="0"/>
+                    </a:p>
+                  </a:txBody>
+                  <a:tcPr/>
+                </a:tc>
+                <a:tc hMerge="1">
+                  <a:txBody>
+                    <a:bodyPr/>
+                    <a:lstStyle/>
+                    <a:p>
+                      <a:endParaRPr lang="en-US" dirty="0"/>
+                    </a:p>
+                  </a:txBody>
+                  <a:tcPr/>
+                </a:tc>
+                <a:extLst>
+                  <a:ext uri="{0D108BD9-81ED-4DB2-BD59-A6C34878D82A}">
+                    <a16:rowId xmlns:a16="http://schemas.microsoft.com/office/drawing/2014/main" val="3148860427"/>
+                  </a:ext>
+                </a:extLst>
+              </a:tr>
+              <a:tr h="524605">
+                <a:tc>
+                  <a:txBody>
+                    <a:bodyPr/>
+                    <a:lstStyle/>
+                    <a:p>
+                      <a:pPr marL="342900" indent="-342900">
+                        <a:buAutoNum type="arabicPeriod"/>
+                      </a:pPr>
+                      <a:r>
+                        <a:rPr lang="en-US" dirty="0" err="1"/>
+                        <a:t>Sự</a:t>
+                      </a:r>
+                      <a:r>
+                        <a:rPr lang="en-US" dirty="0"/>
+                        <a:t> </a:t>
+                      </a:r>
+                      <a:r>
+                        <a:rPr lang="en-US" dirty="0" err="1"/>
+                        <a:t>cảm</a:t>
+                      </a:r>
+                      <a:r>
+                        <a:rPr lang="en-US" dirty="0"/>
+                        <a:t> </a:t>
+                      </a:r>
+                      <a:r>
+                        <a:rPr lang="en-US" dirty="0" err="1"/>
+                        <a:t>nhận</a:t>
+                      </a:r>
+                      <a:r>
+                        <a:rPr lang="en-US" dirty="0"/>
+                        <a:t> </a:t>
+                      </a:r>
+                      <a:r>
+                        <a:rPr lang="en-US" dirty="0" err="1"/>
+                        <a:t>âm</a:t>
+                      </a:r>
+                      <a:r>
+                        <a:rPr lang="en-US" dirty="0"/>
+                        <a:t> </a:t>
+                      </a:r>
+                      <a:r>
+                        <a:rPr lang="en-US" dirty="0" err="1"/>
+                        <a:t>thanh</a:t>
+                      </a:r>
+                      <a:r>
+                        <a:rPr lang="en-US" dirty="0"/>
+                        <a:t> </a:t>
+                      </a:r>
+                    </a:p>
+                    <a:p>
+                      <a:pPr marL="0" indent="0">
+                        <a:buNone/>
+                      </a:pPr>
+                      <a:r>
+                        <a:rPr lang="en-US" dirty="0"/>
+                        <a:t>(1 </a:t>
+                      </a:r>
+                      <a:r>
+                        <a:rPr lang="en-US" dirty="0" err="1"/>
+                        <a:t>ngày</a:t>
+                      </a:r>
+                      <a:r>
+                        <a:rPr lang="en-US" dirty="0"/>
+                        <a:t>)</a:t>
+                      </a:r>
+                    </a:p>
+                  </a:txBody>
+                  <a:tcPr/>
+                </a:tc>
+                <a:tc>
+                  <a:txBody>
+                    <a:bodyPr/>
+                    <a:lstStyle/>
+                    <a:p>
+                      <a:r>
+                        <a:rPr lang="en-US" dirty="0" err="1"/>
+                        <a:t>Thí</a:t>
+                      </a:r>
+                      <a:r>
+                        <a:rPr lang="en-US" dirty="0"/>
+                        <a:t> </a:t>
+                      </a:r>
+                      <a:r>
+                        <a:rPr lang="en-US" dirty="0" err="1"/>
+                        <a:t>nghiệm</a:t>
+                      </a:r>
+                      <a:r>
+                        <a:rPr lang="en-US" dirty="0"/>
+                        <a:t> - </a:t>
+                      </a:r>
+                      <a:r>
+                        <a:rPr lang="en-US" dirty="0" err="1"/>
+                        <a:t>trải</a:t>
+                      </a:r>
+                      <a:r>
+                        <a:rPr lang="en-US" dirty="0"/>
+                        <a:t> </a:t>
+                      </a:r>
+                      <a:r>
+                        <a:rPr lang="en-US" dirty="0" err="1"/>
+                        <a:t>nghiệm</a:t>
+                      </a:r>
+                      <a:r>
+                        <a:rPr lang="en-US" dirty="0"/>
+                        <a:t>, </a:t>
+                      </a:r>
+                      <a:r>
+                        <a:rPr lang="en-US" dirty="0" err="1"/>
+                        <a:t>ghi</a:t>
+                      </a:r>
+                      <a:r>
+                        <a:rPr lang="en-US" dirty="0"/>
+                        <a:t> </a:t>
+                      </a:r>
+                      <a:r>
+                        <a:rPr lang="en-US" dirty="0" err="1"/>
+                        <a:t>chép</a:t>
+                      </a:r>
+                      <a:endParaRPr lang="en-US" dirty="0"/>
+                    </a:p>
+                    <a:p>
+                      <a:r>
+                        <a:rPr lang="en-US" dirty="0" err="1"/>
+                        <a:t>Mô</a:t>
+                      </a:r>
+                      <a:r>
+                        <a:rPr lang="en-US" dirty="0"/>
+                        <a:t> </a:t>
+                      </a:r>
+                      <a:r>
+                        <a:rPr lang="en-US" dirty="0" err="1"/>
+                        <a:t>tả</a:t>
+                      </a:r>
+                      <a:r>
+                        <a:rPr lang="en-US" dirty="0"/>
+                        <a:t>  (</a:t>
+                      </a:r>
+                      <a:r>
+                        <a:rPr lang="en-US" dirty="0" err="1"/>
+                        <a:t>thơ</a:t>
+                      </a:r>
+                      <a:r>
+                        <a:rPr lang="en-US" dirty="0"/>
+                        <a:t>, </a:t>
+                      </a:r>
+                      <a:r>
+                        <a:rPr lang="en-US" dirty="0" err="1"/>
+                        <a:t>vẽ</a:t>
+                      </a:r>
+                      <a:r>
+                        <a:rPr lang="en-US" dirty="0"/>
+                        <a:t>…) </a:t>
+                      </a:r>
+                    </a:p>
+                    <a:p>
+                      <a:endParaRPr lang="en-US" dirty="0"/>
+                    </a:p>
+                  </a:txBody>
+                  <a:tcPr/>
+                </a:tc>
+                <a:tc>
+                  <a:txBody>
+                    <a:bodyPr/>
+                    <a:lstStyle/>
+                    <a:p>
+                      <a:endParaRPr lang="en-US" dirty="0"/>
+                    </a:p>
+                  </a:txBody>
+                  <a:tcPr/>
+                </a:tc>
+                <a:extLst>
+                  <a:ext uri="{0D108BD9-81ED-4DB2-BD59-A6C34878D82A}">
+                    <a16:rowId xmlns:a16="http://schemas.microsoft.com/office/drawing/2014/main" val="411098317"/>
+                  </a:ext>
+                </a:extLst>
+              </a:tr>
+              <a:tr h="905482">
+                <a:tc>
+                  <a:txBody>
+                    <a:bodyPr/>
+                    <a:lstStyle/>
+                    <a:p>
+                      <a:r>
+                        <a:rPr lang="en-US" dirty="0"/>
+                        <a:t>2. </a:t>
+                      </a:r>
+                      <a:r>
+                        <a:rPr lang="en-US" dirty="0" err="1"/>
+                        <a:t>Đặc</a:t>
+                      </a:r>
+                      <a:r>
+                        <a:rPr lang="en-US" dirty="0"/>
+                        <a:t> </a:t>
+                      </a:r>
+                      <a:r>
+                        <a:rPr lang="en-US" dirty="0" err="1"/>
+                        <a:t>tính</a:t>
+                      </a:r>
+                      <a:r>
+                        <a:rPr lang="en-US" dirty="0"/>
+                        <a:t> </a:t>
+                      </a:r>
+                      <a:r>
+                        <a:rPr lang="en-US" dirty="0" err="1"/>
+                        <a:t>nhạc</a:t>
+                      </a:r>
+                      <a:r>
+                        <a:rPr lang="en-US" dirty="0"/>
+                        <a:t> </a:t>
+                      </a:r>
+                      <a:r>
+                        <a:rPr lang="en-US" dirty="0" err="1"/>
+                        <a:t>của</a:t>
+                      </a:r>
+                      <a:r>
+                        <a:rPr lang="en-US" dirty="0"/>
+                        <a:t> </a:t>
+                      </a:r>
+                      <a:r>
+                        <a:rPr lang="en-US" dirty="0" err="1"/>
+                        <a:t>âm</a:t>
+                      </a:r>
+                      <a:r>
+                        <a:rPr lang="en-US" dirty="0"/>
+                        <a:t> </a:t>
+                      </a:r>
+                      <a:r>
+                        <a:rPr lang="en-US" dirty="0" err="1"/>
+                        <a:t>thanh</a:t>
+                      </a:r>
+                      <a:r>
+                        <a:rPr lang="en-US" dirty="0"/>
+                        <a:t> (1 </a:t>
+                      </a:r>
+                      <a:r>
+                        <a:rPr lang="en-US" dirty="0" err="1"/>
+                        <a:t>ngày</a:t>
+                      </a:r>
+                      <a:r>
+                        <a:rPr lang="en-US" dirty="0"/>
+                        <a:t>)</a:t>
+                      </a:r>
+                    </a:p>
+                  </a:txBody>
+                  <a:tcPr/>
+                </a:tc>
+                <a:tc>
+                  <a:txBody>
+                    <a:bodyPr/>
+                    <a:lstStyle/>
+                    <a:p>
+                      <a:r>
+                        <a:rPr lang="en-US" dirty="0"/>
+                        <a:t>Story </a:t>
+                      </a:r>
+                      <a:r>
+                        <a:rPr lang="en-US" dirty="0" err="1"/>
+                        <a:t>Lạc</a:t>
+                      </a:r>
+                      <a:r>
+                        <a:rPr lang="en-US" dirty="0"/>
+                        <a:t> Long </a:t>
+                      </a:r>
+                      <a:r>
+                        <a:rPr lang="en-US" dirty="0" err="1"/>
+                        <a:t>Quân</a:t>
+                      </a:r>
+                      <a:r>
+                        <a:rPr lang="en-US" dirty="0"/>
+                        <a:t> </a:t>
+                      </a:r>
+                      <a:r>
+                        <a:rPr lang="en-US" dirty="0" err="1"/>
+                        <a:t>đánh</a:t>
+                      </a:r>
+                      <a:r>
+                        <a:rPr lang="en-US" dirty="0"/>
+                        <a:t> </a:t>
+                      </a:r>
+                      <a:r>
+                        <a:rPr lang="en-US" dirty="0" err="1"/>
+                        <a:t>Quỷ</a:t>
+                      </a:r>
+                      <a:r>
+                        <a:rPr lang="en-US" dirty="0"/>
+                        <a:t> </a:t>
+                      </a:r>
+                      <a:r>
+                        <a:rPr lang="en-US" dirty="0" err="1"/>
+                        <a:t>Xương</a:t>
+                      </a:r>
+                      <a:r>
+                        <a:rPr lang="en-US" dirty="0"/>
+                        <a:t> </a:t>
+                      </a:r>
+                      <a:r>
+                        <a:rPr lang="en-US" dirty="0" err="1"/>
+                        <a:t>Cuồng</a:t>
+                      </a:r>
+                      <a:r>
+                        <a:rPr lang="en-US" dirty="0"/>
+                        <a:t>. </a:t>
+                      </a:r>
+                      <a:r>
+                        <a:rPr lang="en-US" dirty="0" err="1"/>
+                        <a:t>Thảo</a:t>
+                      </a:r>
+                      <a:r>
+                        <a:rPr lang="en-US" dirty="0"/>
+                        <a:t> </a:t>
+                      </a:r>
+                      <a:r>
+                        <a:rPr lang="en-US" dirty="0" err="1"/>
+                        <a:t>luận</a:t>
+                      </a:r>
+                      <a:r>
+                        <a:rPr lang="en-US" dirty="0"/>
+                        <a:t>.  </a:t>
+                      </a:r>
+                    </a:p>
+                  </a:txBody>
+                  <a:tcPr/>
+                </a:tc>
+                <a:tc>
+                  <a:txBody>
+                    <a:bodyPr/>
+                    <a:lstStyle/>
+                    <a:p>
+                      <a:endParaRPr lang="en-US" dirty="0"/>
+                    </a:p>
+                  </a:txBody>
+                  <a:tcPr/>
+                </a:tc>
+                <a:extLst>
+                  <a:ext uri="{0D108BD9-81ED-4DB2-BD59-A6C34878D82A}">
+                    <a16:rowId xmlns:a16="http://schemas.microsoft.com/office/drawing/2014/main" val="857105302"/>
+                  </a:ext>
+                </a:extLst>
+              </a:tr>
+              <a:tr h="905482">
+                <a:tc>
+                  <a:txBody>
+                    <a:bodyPr/>
+                    <a:lstStyle/>
+                    <a:p>
+                      <a:r>
+                        <a:rPr lang="en-US" dirty="0"/>
+                        <a:t>3. </a:t>
+                      </a:r>
+                      <a:r>
+                        <a:rPr lang="en-US" dirty="0" err="1"/>
+                        <a:t>Độ</a:t>
+                      </a:r>
+                      <a:r>
+                        <a:rPr lang="en-US" dirty="0"/>
+                        <a:t> </a:t>
+                      </a:r>
+                      <a:r>
+                        <a:rPr lang="en-US" dirty="0" err="1"/>
+                        <a:t>cao</a:t>
+                      </a:r>
+                      <a:r>
+                        <a:rPr lang="en-US" dirty="0"/>
+                        <a:t>, </a:t>
+                      </a:r>
+                      <a:r>
+                        <a:rPr lang="en-US" dirty="0" err="1"/>
+                        <a:t>độ</a:t>
+                      </a:r>
+                      <a:r>
+                        <a:rPr lang="en-US" dirty="0"/>
+                        <a:t> </a:t>
+                      </a:r>
+                      <a:r>
+                        <a:rPr lang="en-US" dirty="0" err="1"/>
+                        <a:t>mạnh</a:t>
+                      </a:r>
+                      <a:r>
+                        <a:rPr lang="en-US" dirty="0"/>
+                        <a:t> </a:t>
+                      </a:r>
+                      <a:r>
+                        <a:rPr lang="en-US" dirty="0" err="1"/>
+                        <a:t>của</a:t>
+                      </a:r>
+                      <a:r>
+                        <a:rPr lang="en-US" dirty="0"/>
+                        <a:t> </a:t>
+                      </a:r>
+                      <a:r>
+                        <a:rPr lang="en-US" dirty="0" err="1"/>
+                        <a:t>âm</a:t>
+                      </a:r>
+                      <a:r>
+                        <a:rPr lang="en-US" dirty="0"/>
+                        <a:t> </a:t>
+                      </a:r>
+                      <a:r>
+                        <a:rPr lang="en-US" dirty="0" err="1"/>
+                        <a:t>thanh</a:t>
+                      </a:r>
+                      <a:r>
+                        <a:rPr lang="en-US" dirty="0"/>
+                        <a:t> (1 </a:t>
+                      </a:r>
+                      <a:r>
+                        <a:rPr lang="en-US" dirty="0" err="1"/>
+                        <a:t>ngày</a:t>
+                      </a:r>
+                      <a:r>
+                        <a:rPr lang="en-US" dirty="0"/>
+                        <a:t>)</a:t>
+                      </a:r>
+                    </a:p>
+                  </a:txBody>
+                  <a:tcPr/>
+                </a:tc>
+                <a:tc>
+                  <a:txBody>
+                    <a:bodyPr/>
+                    <a:lstStyle/>
+                    <a:p>
+                      <a:r>
+                        <a:rPr lang="en-US" dirty="0" err="1"/>
+                        <a:t>Tính</a:t>
+                      </a:r>
+                      <a:r>
+                        <a:rPr lang="en-US" dirty="0"/>
+                        <a:t> </a:t>
+                      </a:r>
+                      <a:r>
+                        <a:rPr lang="en-US" dirty="0" err="1"/>
+                        <a:t>chất</a:t>
+                      </a:r>
+                      <a:r>
+                        <a:rPr lang="en-US" dirty="0"/>
+                        <a:t> </a:t>
+                      </a:r>
+                      <a:r>
+                        <a:rPr lang="en-US" dirty="0" err="1"/>
+                        <a:t>của</a:t>
+                      </a:r>
+                      <a:r>
+                        <a:rPr lang="en-US" dirty="0"/>
+                        <a:t> </a:t>
+                      </a:r>
+                      <a:r>
+                        <a:rPr lang="en-US" dirty="0" err="1"/>
+                        <a:t>âm</a:t>
+                      </a:r>
+                      <a:r>
+                        <a:rPr lang="en-US" dirty="0"/>
+                        <a:t> </a:t>
+                      </a:r>
+                      <a:r>
+                        <a:rPr lang="en-US" dirty="0" err="1"/>
+                        <a:t>thanh</a:t>
+                      </a:r>
+                      <a:r>
+                        <a:rPr lang="en-US" dirty="0"/>
+                        <a:t> (qua </a:t>
+                      </a:r>
+                      <a:r>
+                        <a:rPr lang="en-US" dirty="0" err="1"/>
+                        <a:t>cảm</a:t>
+                      </a:r>
+                      <a:r>
+                        <a:rPr lang="en-US" dirty="0"/>
+                        <a:t> </a:t>
+                      </a:r>
+                      <a:r>
+                        <a:rPr lang="en-US" dirty="0" err="1"/>
+                        <a:t>nhận</a:t>
+                      </a:r>
+                      <a:r>
+                        <a:rPr lang="en-US" dirty="0"/>
+                        <a:t> </a:t>
+                      </a:r>
+                      <a:r>
+                        <a:rPr lang="en-US" dirty="0" err="1"/>
+                        <a:t>của</a:t>
+                      </a:r>
+                      <a:r>
+                        <a:rPr lang="en-US" dirty="0"/>
+                        <a:t> con </a:t>
+                      </a:r>
+                      <a:r>
+                        <a:rPr lang="en-US" dirty="0" err="1"/>
+                        <a:t>người</a:t>
+                      </a:r>
+                      <a:r>
+                        <a:rPr lang="en-US" dirty="0"/>
+                        <a:t>)</a:t>
+                      </a:r>
+                    </a:p>
+                  </a:txBody>
+                  <a:tcPr/>
+                </a:tc>
+                <a:tc>
+                  <a:txBody>
+                    <a:bodyPr/>
+                    <a:lstStyle/>
+                    <a:p>
+                      <a:endParaRPr lang="en-US" dirty="0"/>
+                    </a:p>
+                  </a:txBody>
+                  <a:tcPr/>
+                </a:tc>
+                <a:extLst>
+                  <a:ext uri="{0D108BD9-81ED-4DB2-BD59-A6C34878D82A}">
+                    <a16:rowId xmlns:a16="http://schemas.microsoft.com/office/drawing/2014/main" val="2322971736"/>
+                  </a:ext>
+                </a:extLst>
+              </a:tr>
+              <a:tr h="1681611">
+                <a:tc>
+                  <a:txBody>
+                    <a:bodyPr/>
+                    <a:lstStyle/>
+                    <a:p>
+                      <a:r>
+                        <a:rPr lang="en-US" dirty="0"/>
+                        <a:t>4. </a:t>
+                      </a:r>
+                      <a:r>
+                        <a:rPr lang="en-US" dirty="0" err="1"/>
+                        <a:t>Đặc</a:t>
+                      </a:r>
+                      <a:r>
+                        <a:rPr lang="en-US" dirty="0"/>
+                        <a:t> </a:t>
+                      </a:r>
+                      <a:r>
+                        <a:rPr lang="en-US" dirty="0" err="1"/>
+                        <a:t>tính</a:t>
+                      </a:r>
+                      <a:r>
+                        <a:rPr lang="en-US" dirty="0"/>
+                        <a:t> </a:t>
+                      </a:r>
+                      <a:r>
+                        <a:rPr lang="en-US" dirty="0" err="1"/>
+                        <a:t>cơ</a:t>
+                      </a:r>
+                      <a:r>
+                        <a:rPr lang="en-US" dirty="0"/>
+                        <a:t> </a:t>
+                      </a:r>
+                      <a:r>
+                        <a:rPr lang="en-US" dirty="0" err="1"/>
+                        <a:t>học</a:t>
+                      </a:r>
+                      <a:r>
+                        <a:rPr lang="en-US" dirty="0"/>
+                        <a:t> </a:t>
+                      </a:r>
+                      <a:r>
+                        <a:rPr lang="en-US" dirty="0" err="1"/>
+                        <a:t>của</a:t>
+                      </a:r>
+                      <a:r>
+                        <a:rPr lang="en-US" dirty="0"/>
+                        <a:t> </a:t>
+                      </a:r>
+                      <a:r>
+                        <a:rPr lang="en-US" dirty="0" err="1"/>
+                        <a:t>âm</a:t>
+                      </a:r>
+                      <a:r>
+                        <a:rPr lang="en-US" dirty="0"/>
+                        <a:t> </a:t>
+                      </a:r>
+                      <a:r>
+                        <a:rPr lang="en-US" dirty="0" err="1"/>
+                        <a:t>thanh</a:t>
+                      </a:r>
+                      <a:r>
+                        <a:rPr lang="en-US" dirty="0"/>
+                        <a:t>, </a:t>
+                      </a:r>
+                      <a:r>
+                        <a:rPr lang="en-US" dirty="0" err="1"/>
+                        <a:t>nguồn</a:t>
+                      </a:r>
+                      <a:r>
+                        <a:rPr lang="en-US" dirty="0"/>
+                        <a:t> </a:t>
+                      </a:r>
+                      <a:r>
+                        <a:rPr lang="en-US" dirty="0" err="1"/>
+                        <a:t>âm</a:t>
+                      </a:r>
+                      <a:r>
+                        <a:rPr lang="en-US" dirty="0"/>
+                        <a:t> </a:t>
+                      </a:r>
+                      <a:r>
+                        <a:rPr lang="en-US" dirty="0" err="1"/>
+                        <a:t>thanh</a:t>
+                      </a:r>
+                      <a:r>
+                        <a:rPr lang="en-US" dirty="0"/>
+                        <a:t>.</a:t>
+                      </a:r>
+                    </a:p>
+                    <a:p>
+                      <a:r>
+                        <a:rPr lang="en-US" dirty="0" err="1"/>
+                        <a:t>Đánh</a:t>
+                      </a:r>
+                      <a:r>
+                        <a:rPr lang="en-US" dirty="0"/>
+                        <a:t> </a:t>
+                      </a:r>
+                      <a:r>
+                        <a:rPr lang="en-US" dirty="0" err="1"/>
+                        <a:t>giá</a:t>
+                      </a:r>
+                      <a:r>
+                        <a:rPr lang="en-US" dirty="0"/>
+                        <a:t> 3 </a:t>
+                      </a:r>
+                      <a:r>
+                        <a:rPr lang="en-US" dirty="0" err="1"/>
+                        <a:t>bộ</a:t>
+                      </a:r>
+                      <a:r>
+                        <a:rPr lang="en-US" dirty="0"/>
+                        <a:t> </a:t>
+                      </a:r>
+                      <a:r>
+                        <a:rPr lang="en-US" dirty="0" err="1"/>
+                        <a:t>nhạc</a:t>
+                      </a:r>
+                      <a:r>
+                        <a:rPr lang="en-US" dirty="0"/>
+                        <a:t> </a:t>
+                      </a:r>
+                      <a:r>
+                        <a:rPr lang="en-US" dirty="0" err="1"/>
+                        <a:t>cụ</a:t>
+                      </a:r>
+                      <a:r>
+                        <a:rPr lang="en-US" dirty="0"/>
+                        <a:t> </a:t>
+                      </a:r>
+                      <a:r>
+                        <a:rPr lang="en-US" dirty="0" err="1"/>
+                        <a:t>và</a:t>
+                      </a:r>
+                      <a:r>
+                        <a:rPr lang="en-US" dirty="0"/>
+                        <a:t> </a:t>
+                      </a:r>
+                      <a:r>
+                        <a:rPr lang="en-US" dirty="0" err="1"/>
+                        <a:t>cách</a:t>
+                      </a:r>
+                      <a:r>
+                        <a:rPr lang="en-US" dirty="0"/>
+                        <a:t> </a:t>
+                      </a:r>
+                      <a:r>
+                        <a:rPr lang="en-US" dirty="0" err="1"/>
+                        <a:t>tạo</a:t>
+                      </a:r>
+                      <a:r>
+                        <a:rPr lang="en-US" dirty="0"/>
+                        <a:t> </a:t>
+                      </a:r>
+                      <a:r>
+                        <a:rPr lang="en-US" dirty="0" err="1"/>
+                        <a:t>âm</a:t>
+                      </a:r>
+                      <a:r>
+                        <a:rPr lang="en-US" dirty="0"/>
+                        <a:t> </a:t>
+                      </a:r>
+                      <a:r>
+                        <a:rPr lang="en-US" dirty="0" err="1"/>
+                        <a:t>thanh</a:t>
+                      </a:r>
+                      <a:r>
+                        <a:rPr lang="en-US" dirty="0"/>
+                        <a:t> (2 </a:t>
+                      </a:r>
+                      <a:r>
+                        <a:rPr lang="en-US" dirty="0" err="1"/>
+                        <a:t>ngày</a:t>
+                      </a:r>
+                      <a:r>
+                        <a:rPr lang="en-US" dirty="0"/>
+                        <a:t>)</a:t>
+                      </a:r>
+                    </a:p>
+                  </a:txBody>
+                  <a:tcPr/>
+                </a:tc>
+                <a:tc>
+                  <a:txBody>
+                    <a:bodyPr/>
+                    <a:lstStyle/>
+                    <a:p>
+                      <a:pPr marL="285750" indent="-285750">
+                        <a:buFontTx/>
+                        <a:buChar char="-"/>
+                      </a:pPr>
+                      <a:r>
+                        <a:rPr lang="en-US" dirty="0" err="1"/>
+                        <a:t>Nguồn</a:t>
+                      </a:r>
+                      <a:r>
+                        <a:rPr lang="en-US" dirty="0"/>
+                        <a:t> </a:t>
+                      </a:r>
+                      <a:r>
+                        <a:rPr lang="en-US" dirty="0" err="1"/>
+                        <a:t>âm</a:t>
+                      </a:r>
+                      <a:r>
+                        <a:rPr lang="en-US" dirty="0"/>
+                        <a:t>: </a:t>
+                      </a:r>
+                      <a:r>
+                        <a:rPr lang="en-US" dirty="0" err="1"/>
+                        <a:t>khi</a:t>
+                      </a:r>
+                      <a:r>
+                        <a:rPr lang="en-US" dirty="0"/>
+                        <a:t> </a:t>
+                      </a:r>
+                      <a:r>
+                        <a:rPr lang="en-US" dirty="0" err="1"/>
+                        <a:t>nào</a:t>
+                      </a:r>
+                      <a:r>
+                        <a:rPr lang="en-US" dirty="0"/>
+                        <a:t> </a:t>
+                      </a:r>
+                      <a:r>
+                        <a:rPr lang="en-US" dirty="0" err="1"/>
+                        <a:t>thì</a:t>
+                      </a:r>
+                      <a:r>
+                        <a:rPr lang="en-US" dirty="0"/>
+                        <a:t> </a:t>
+                      </a:r>
+                      <a:r>
+                        <a:rPr lang="en-US" dirty="0" err="1"/>
+                        <a:t>có</a:t>
+                      </a:r>
+                      <a:r>
+                        <a:rPr lang="en-US" dirty="0"/>
+                        <a:t> </a:t>
+                      </a:r>
+                      <a:r>
+                        <a:rPr lang="en-US" dirty="0" err="1"/>
+                        <a:t>âm</a:t>
+                      </a:r>
+                      <a:r>
+                        <a:rPr lang="en-US" dirty="0"/>
+                        <a:t> </a:t>
+                      </a:r>
+                      <a:r>
+                        <a:rPr lang="en-US" dirty="0" err="1"/>
+                        <a:t>thanh</a:t>
+                      </a:r>
+                      <a:r>
+                        <a:rPr lang="en-US" dirty="0"/>
+                        <a:t>?</a:t>
+                      </a:r>
+                    </a:p>
+                    <a:p>
+                      <a:pPr marL="285750" indent="-285750">
+                        <a:buFontTx/>
+                        <a:buChar char="-"/>
+                      </a:pPr>
+                      <a:r>
+                        <a:rPr lang="en-US" dirty="0" err="1"/>
+                        <a:t>Âm</a:t>
+                      </a:r>
+                      <a:r>
+                        <a:rPr lang="en-US" dirty="0"/>
+                        <a:t> </a:t>
+                      </a:r>
+                      <a:r>
+                        <a:rPr lang="en-US" dirty="0" err="1"/>
+                        <a:t>thanh</a:t>
+                      </a:r>
+                      <a:r>
+                        <a:rPr lang="en-US" dirty="0"/>
+                        <a:t> </a:t>
+                      </a:r>
+                      <a:r>
+                        <a:rPr lang="en-US" dirty="0" err="1"/>
+                        <a:t>đi</a:t>
+                      </a:r>
+                      <a:r>
+                        <a:rPr lang="en-US" dirty="0"/>
+                        <a:t> </a:t>
+                      </a:r>
+                      <a:r>
+                        <a:rPr lang="en-US" dirty="0" err="1"/>
+                        <a:t>ra</a:t>
+                      </a:r>
+                      <a:r>
+                        <a:rPr lang="en-US" dirty="0"/>
+                        <a:t> </a:t>
+                      </a:r>
+                      <a:r>
+                        <a:rPr lang="en-US" dirty="0" err="1"/>
+                        <a:t>ntn</a:t>
+                      </a:r>
+                      <a:r>
+                        <a:rPr lang="en-US" dirty="0"/>
+                        <a:t> </a:t>
+                      </a:r>
+                      <a:r>
+                        <a:rPr lang="en-US" dirty="0" err="1"/>
+                        <a:t>từ</a:t>
+                      </a:r>
+                      <a:r>
+                        <a:rPr lang="en-US" dirty="0"/>
+                        <a:t> </a:t>
+                      </a:r>
+                      <a:r>
+                        <a:rPr lang="en-US" dirty="0" err="1"/>
+                        <a:t>nguồn</a:t>
+                      </a:r>
+                      <a:r>
+                        <a:rPr lang="en-US" dirty="0"/>
+                        <a:t> </a:t>
+                      </a:r>
+                      <a:r>
+                        <a:rPr lang="en-US" dirty="0" err="1"/>
+                        <a:t>âm</a:t>
+                      </a:r>
+                      <a:r>
+                        <a:rPr lang="en-US" dirty="0"/>
+                        <a:t> =&gt; </a:t>
+                      </a:r>
+                      <a:r>
+                        <a:rPr lang="en-US" dirty="0" err="1"/>
+                        <a:t>một</a:t>
+                      </a:r>
+                      <a:r>
+                        <a:rPr lang="en-US" dirty="0"/>
+                        <a:t> </a:t>
+                      </a:r>
+                      <a:r>
+                        <a:rPr lang="en-US" dirty="0" err="1"/>
+                        <a:t>số</a:t>
+                      </a:r>
+                      <a:r>
+                        <a:rPr lang="en-US" dirty="0"/>
+                        <a:t> </a:t>
+                      </a:r>
+                      <a:r>
+                        <a:rPr lang="en-US" dirty="0" err="1"/>
+                        <a:t>đặc</a:t>
+                      </a:r>
+                      <a:r>
+                        <a:rPr lang="en-US" dirty="0"/>
+                        <a:t> </a:t>
+                      </a:r>
+                      <a:r>
+                        <a:rPr lang="en-US" dirty="0" err="1"/>
+                        <a:t>tính</a:t>
+                      </a:r>
+                      <a:r>
+                        <a:rPr lang="en-US" dirty="0"/>
+                        <a:t> </a:t>
+                      </a:r>
+                      <a:r>
+                        <a:rPr lang="en-US" dirty="0" err="1"/>
+                        <a:t>cơ</a:t>
+                      </a:r>
+                      <a:r>
+                        <a:rPr lang="en-US" dirty="0"/>
+                        <a:t> </a:t>
+                      </a:r>
+                      <a:r>
+                        <a:rPr lang="en-US" dirty="0" err="1"/>
+                        <a:t>bản</a:t>
+                      </a:r>
+                      <a:r>
+                        <a:rPr lang="en-US" dirty="0"/>
+                        <a:t>: </a:t>
+                      </a:r>
+                      <a:r>
+                        <a:rPr lang="en-US" dirty="0" err="1"/>
+                        <a:t>Định</a:t>
+                      </a:r>
+                      <a:r>
+                        <a:rPr lang="en-US" dirty="0"/>
+                        <a:t> </a:t>
+                      </a:r>
+                      <a:r>
+                        <a:rPr lang="en-US" dirty="0" err="1"/>
+                        <a:t>hướng</a:t>
+                      </a:r>
+                      <a:r>
+                        <a:rPr lang="en-US" dirty="0"/>
+                        <a:t> </a:t>
+                      </a:r>
+                      <a:r>
+                        <a:rPr lang="en-US" dirty="0" err="1"/>
+                        <a:t>âm</a:t>
+                      </a:r>
+                      <a:r>
+                        <a:rPr lang="en-US" dirty="0"/>
+                        <a:t> (loa), </a:t>
+                      </a:r>
+                      <a:r>
+                        <a:rPr lang="en-US" dirty="0" err="1"/>
+                        <a:t>Phản</a:t>
+                      </a:r>
+                      <a:r>
+                        <a:rPr lang="en-US" dirty="0"/>
+                        <a:t> </a:t>
+                      </a:r>
+                      <a:r>
+                        <a:rPr lang="en-US" dirty="0" err="1"/>
+                        <a:t>xạ</a:t>
+                      </a:r>
+                      <a:r>
+                        <a:rPr lang="en-US" dirty="0"/>
+                        <a:t> </a:t>
+                      </a:r>
+                      <a:r>
+                        <a:rPr lang="en-US" dirty="0" err="1"/>
+                        <a:t>âm</a:t>
+                      </a:r>
+                      <a:r>
+                        <a:rPr lang="en-US" dirty="0"/>
+                        <a:t>, </a:t>
+                      </a:r>
+                      <a:r>
+                        <a:rPr lang="en-US" dirty="0" err="1"/>
+                        <a:t>Cường</a:t>
+                      </a:r>
+                      <a:r>
+                        <a:rPr lang="en-US" dirty="0"/>
+                        <a:t> </a:t>
+                      </a:r>
+                      <a:r>
+                        <a:rPr lang="en-US" dirty="0" err="1"/>
+                        <a:t>độ</a:t>
+                      </a:r>
+                      <a:r>
+                        <a:rPr lang="en-US" dirty="0"/>
+                        <a:t> </a:t>
+                      </a:r>
+                      <a:r>
+                        <a:rPr lang="en-US" dirty="0" err="1"/>
+                        <a:t>âm</a:t>
+                      </a:r>
+                      <a:r>
+                        <a:rPr lang="en-US" dirty="0"/>
+                        <a:t> </a:t>
+                      </a:r>
+                    </a:p>
+                    <a:p>
+                      <a:pPr marL="285750" indent="-285750">
+                        <a:buFontTx/>
+                        <a:buChar char="-"/>
+                      </a:pPr>
+                      <a:r>
+                        <a:rPr lang="en-US" dirty="0" err="1"/>
+                        <a:t>Tính</a:t>
+                      </a:r>
+                      <a:r>
+                        <a:rPr lang="en-US" dirty="0"/>
+                        <a:t> </a:t>
+                      </a:r>
+                      <a:r>
+                        <a:rPr lang="en-US" dirty="0" err="1"/>
+                        <a:t>chất</a:t>
+                      </a:r>
+                      <a:r>
+                        <a:rPr lang="en-US" dirty="0"/>
+                        <a:t> </a:t>
+                      </a:r>
+                      <a:r>
+                        <a:rPr lang="en-US" dirty="0" err="1"/>
+                        <a:t>vật</a:t>
+                      </a:r>
+                      <a:r>
+                        <a:rPr lang="en-US" dirty="0"/>
+                        <a:t> </a:t>
+                      </a:r>
+                      <a:r>
+                        <a:rPr lang="en-US" dirty="0" err="1"/>
+                        <a:t>lý</a:t>
+                      </a:r>
+                      <a:r>
+                        <a:rPr lang="en-US" dirty="0"/>
+                        <a:t> </a:t>
+                      </a:r>
+                      <a:r>
+                        <a:rPr lang="en-US" dirty="0" err="1"/>
+                        <a:t>của</a:t>
+                      </a:r>
+                      <a:r>
+                        <a:rPr lang="en-US" dirty="0"/>
+                        <a:t> </a:t>
+                      </a:r>
+                      <a:r>
+                        <a:rPr lang="en-US" dirty="0" err="1"/>
+                        <a:t>âm</a:t>
+                      </a:r>
+                      <a:r>
+                        <a:rPr lang="en-US" dirty="0"/>
+                        <a:t> </a:t>
+                      </a:r>
+                      <a:r>
+                        <a:rPr lang="en-US" dirty="0" err="1"/>
+                        <a:t>thanh</a:t>
+                      </a:r>
+                      <a:r>
+                        <a:rPr lang="en-US" dirty="0"/>
+                        <a:t> vs. </a:t>
+                      </a:r>
+                      <a:r>
+                        <a:rPr lang="en-US" dirty="0" err="1"/>
+                        <a:t>cảm</a:t>
+                      </a:r>
+                      <a:r>
+                        <a:rPr lang="en-US" dirty="0"/>
+                        <a:t> </a:t>
+                      </a:r>
+                      <a:r>
+                        <a:rPr lang="en-US" dirty="0" err="1"/>
+                        <a:t>nhận</a:t>
+                      </a:r>
+                      <a:r>
+                        <a:rPr lang="en-US" dirty="0"/>
+                        <a:t> </a:t>
+                      </a:r>
+                      <a:r>
+                        <a:rPr lang="en-US" dirty="0" err="1"/>
+                        <a:t>của</a:t>
+                      </a:r>
+                      <a:r>
+                        <a:rPr lang="en-US" dirty="0"/>
+                        <a:t> con </a:t>
+                      </a:r>
+                      <a:r>
+                        <a:rPr lang="en-US" dirty="0" err="1"/>
+                        <a:t>người</a:t>
+                      </a:r>
+                      <a:r>
+                        <a:rPr lang="en-US" dirty="0"/>
+                        <a:t>: </a:t>
+                      </a:r>
+                      <a:r>
+                        <a:rPr lang="en-US" dirty="0" err="1"/>
+                        <a:t>Vì</a:t>
+                      </a:r>
+                      <a:r>
+                        <a:rPr lang="en-US" dirty="0"/>
+                        <a:t> </a:t>
+                      </a:r>
+                      <a:r>
+                        <a:rPr lang="en-US" dirty="0" err="1"/>
+                        <a:t>sao</a:t>
+                      </a:r>
+                      <a:r>
+                        <a:rPr lang="en-US" dirty="0"/>
+                        <a:t> ta </a:t>
+                      </a:r>
+                      <a:r>
+                        <a:rPr lang="en-US" dirty="0" err="1"/>
+                        <a:t>lại</a:t>
+                      </a:r>
+                      <a:r>
+                        <a:rPr lang="en-US" dirty="0"/>
+                        <a:t> </a:t>
+                      </a:r>
+                      <a:r>
+                        <a:rPr lang="en-US" dirty="0" err="1"/>
+                        <a:t>cảm</a:t>
+                      </a:r>
+                      <a:r>
+                        <a:rPr lang="en-US" dirty="0"/>
+                        <a:t> </a:t>
+                      </a:r>
+                      <a:r>
+                        <a:rPr lang="en-US" dirty="0" err="1"/>
+                        <a:t>nhận</a:t>
+                      </a:r>
+                      <a:r>
+                        <a:rPr lang="en-US" dirty="0"/>
+                        <a:t> </a:t>
+                      </a:r>
+                      <a:r>
+                        <a:rPr lang="en-US" dirty="0" err="1"/>
+                        <a:t>một</a:t>
+                      </a:r>
+                      <a:r>
+                        <a:rPr lang="en-US" dirty="0"/>
+                        <a:t> </a:t>
+                      </a:r>
+                      <a:r>
+                        <a:rPr lang="en-US" dirty="0" err="1"/>
+                        <a:t>âm</a:t>
+                      </a:r>
+                      <a:r>
+                        <a:rPr lang="en-US" dirty="0"/>
+                        <a:t> </a:t>
+                      </a:r>
+                      <a:r>
+                        <a:rPr lang="en-US" dirty="0" err="1"/>
+                        <a:t>thanh</a:t>
+                      </a:r>
+                      <a:r>
+                        <a:rPr lang="en-US" dirty="0"/>
+                        <a:t> </a:t>
+                      </a:r>
+                      <a:r>
+                        <a:rPr lang="en-US" dirty="0" err="1"/>
+                        <a:t>nào</a:t>
+                      </a:r>
+                      <a:r>
+                        <a:rPr lang="en-US" dirty="0"/>
+                        <a:t> </a:t>
+                      </a:r>
+                      <a:r>
+                        <a:rPr lang="en-US" dirty="0" err="1"/>
+                        <a:t>đó</a:t>
+                      </a:r>
+                      <a:r>
+                        <a:rPr lang="en-US" dirty="0"/>
+                        <a:t> </a:t>
+                      </a:r>
+                      <a:r>
+                        <a:rPr lang="en-US" dirty="0" err="1"/>
+                        <a:t>như</a:t>
+                      </a:r>
+                      <a:r>
+                        <a:rPr lang="en-US" dirty="0"/>
+                        <a:t> </a:t>
+                      </a:r>
+                      <a:r>
+                        <a:rPr lang="en-US" dirty="0" err="1"/>
+                        <a:t>vậy</a:t>
+                      </a:r>
+                      <a:r>
+                        <a:rPr lang="en-US" dirty="0"/>
+                        <a:t>?</a:t>
+                      </a:r>
+                    </a:p>
+                  </a:txBody>
+                  <a:tcPr/>
+                </a:tc>
+                <a:tc>
+                  <a:txBody>
+                    <a:bodyPr/>
+                    <a:lstStyle/>
+                    <a:p>
+                      <a:r>
+                        <a:rPr lang="en-US" dirty="0" err="1"/>
+                        <a:t>Thí</a:t>
+                      </a:r>
+                      <a:r>
+                        <a:rPr lang="en-US" dirty="0"/>
+                        <a:t> </a:t>
+                      </a:r>
+                      <a:r>
+                        <a:rPr lang="en-US" dirty="0" err="1"/>
+                        <a:t>nghiệm</a:t>
+                      </a:r>
+                      <a:r>
+                        <a:rPr lang="en-US" dirty="0"/>
+                        <a:t> (</a:t>
+                      </a:r>
+                      <a:r>
+                        <a:rPr lang="en-US" dirty="0" err="1"/>
+                        <a:t>va</a:t>
+                      </a:r>
+                      <a:r>
+                        <a:rPr lang="en-US" dirty="0"/>
+                        <a:t> </a:t>
+                      </a:r>
+                      <a:r>
+                        <a:rPr lang="en-US" dirty="0" err="1"/>
+                        <a:t>chạm</a:t>
+                      </a:r>
+                      <a:r>
+                        <a:rPr lang="en-US" dirty="0"/>
+                        <a:t> </a:t>
+                      </a:r>
+                      <a:r>
+                        <a:rPr lang="en-US" dirty="0" err="1"/>
+                        <a:t>tạo</a:t>
+                      </a:r>
+                      <a:r>
+                        <a:rPr lang="en-US" dirty="0"/>
+                        <a:t> </a:t>
+                      </a:r>
+                      <a:r>
+                        <a:rPr lang="en-US" dirty="0" err="1"/>
+                        <a:t>ra</a:t>
+                      </a:r>
+                      <a:r>
+                        <a:rPr lang="en-US" dirty="0"/>
+                        <a:t> </a:t>
+                      </a:r>
+                      <a:r>
+                        <a:rPr lang="en-US" dirty="0" err="1"/>
+                        <a:t>âm</a:t>
+                      </a:r>
+                      <a:r>
+                        <a:rPr lang="en-US" dirty="0"/>
+                        <a:t>)</a:t>
+                      </a:r>
+                    </a:p>
+                  </a:txBody>
+                  <a:tcPr/>
+                </a:tc>
+                <a:extLst>
+                  <a:ext uri="{0D108BD9-81ED-4DB2-BD59-A6C34878D82A}">
+                    <a16:rowId xmlns:a16="http://schemas.microsoft.com/office/drawing/2014/main" val="1966171852"/>
+                  </a:ext>
+                </a:extLst>
+              </a:tr>
+              <a:tr h="905482">
+                <a:tc>
+                  <a:txBody>
+                    <a:bodyPr/>
+                    <a:lstStyle/>
+                    <a:p>
+                      <a:r>
+                        <a:rPr lang="en-US" dirty="0"/>
+                        <a:t>5. </a:t>
+                      </a:r>
+                      <a:r>
+                        <a:rPr lang="en-US" dirty="0" err="1"/>
+                        <a:t>Môi</a:t>
+                      </a:r>
+                      <a:r>
+                        <a:rPr lang="en-US" dirty="0"/>
+                        <a:t> </a:t>
+                      </a:r>
+                      <a:r>
+                        <a:rPr lang="en-US" dirty="0" err="1"/>
+                        <a:t>trường</a:t>
+                      </a:r>
+                      <a:r>
+                        <a:rPr lang="en-US" dirty="0"/>
+                        <a:t> </a:t>
+                      </a:r>
+                      <a:r>
+                        <a:rPr lang="en-US" dirty="0" err="1"/>
+                        <a:t>truyền</a:t>
+                      </a:r>
+                      <a:r>
+                        <a:rPr lang="en-US" dirty="0"/>
+                        <a:t> </a:t>
+                      </a:r>
+                      <a:r>
+                        <a:rPr lang="en-US" dirty="0" err="1"/>
+                        <a:t>âm</a:t>
+                      </a:r>
+                      <a:endParaRPr lang="en-US" dirty="0"/>
+                    </a:p>
+                  </a:txBody>
+                  <a:tcPr/>
+                </a:tc>
+                <a:tc>
+                  <a:txBody>
+                    <a:bodyPr/>
+                    <a:lstStyle/>
+                    <a:p>
+                      <a:r>
+                        <a:rPr lang="en-US" dirty="0" err="1"/>
+                        <a:t>Âm</a:t>
+                      </a:r>
+                      <a:r>
+                        <a:rPr lang="en-US" dirty="0"/>
+                        <a:t> </a:t>
+                      </a:r>
+                      <a:r>
+                        <a:rPr lang="en-US" dirty="0" err="1"/>
+                        <a:t>thanh</a:t>
+                      </a:r>
+                      <a:r>
+                        <a:rPr lang="en-US" dirty="0"/>
+                        <a:t> </a:t>
+                      </a:r>
+                      <a:r>
+                        <a:rPr lang="en-US" dirty="0" err="1"/>
+                        <a:t>truyền</a:t>
+                      </a:r>
+                      <a:r>
+                        <a:rPr lang="en-US" dirty="0"/>
+                        <a:t> </a:t>
+                      </a:r>
+                      <a:r>
+                        <a:rPr lang="en-US" dirty="0" err="1"/>
+                        <a:t>đi</a:t>
+                      </a:r>
+                      <a:r>
+                        <a:rPr lang="en-US" dirty="0"/>
+                        <a:t> </a:t>
+                      </a:r>
+                      <a:r>
+                        <a:rPr lang="en-US" dirty="0" err="1"/>
+                        <a:t>trong</a:t>
+                      </a:r>
+                      <a:r>
+                        <a:rPr lang="en-US" dirty="0"/>
+                        <a:t> </a:t>
+                      </a:r>
+                      <a:r>
+                        <a:rPr lang="en-US" dirty="0" err="1"/>
+                        <a:t>các</a:t>
+                      </a:r>
+                      <a:r>
+                        <a:rPr lang="en-US" dirty="0"/>
+                        <a:t> </a:t>
+                      </a:r>
+                      <a:r>
+                        <a:rPr lang="en-US" dirty="0" err="1"/>
+                        <a:t>môi</a:t>
+                      </a:r>
+                      <a:r>
+                        <a:rPr lang="en-US" dirty="0"/>
+                        <a:t> </a:t>
+                      </a:r>
+                      <a:r>
+                        <a:rPr lang="en-US" dirty="0" err="1"/>
+                        <a:t>trường</a:t>
+                      </a:r>
+                      <a:r>
+                        <a:rPr lang="en-US" dirty="0"/>
+                        <a:t> </a:t>
+                      </a:r>
+                      <a:r>
+                        <a:rPr lang="en-US" dirty="0" err="1"/>
+                        <a:t>khác</a:t>
+                      </a:r>
+                      <a:r>
+                        <a:rPr lang="en-US" dirty="0"/>
+                        <a:t> </a:t>
+                      </a:r>
+                      <a:r>
+                        <a:rPr lang="en-US" dirty="0" err="1"/>
+                        <a:t>nhau</a:t>
+                      </a:r>
+                      <a:r>
+                        <a:rPr lang="en-US" dirty="0"/>
+                        <a:t> </a:t>
+                      </a:r>
+                      <a:r>
+                        <a:rPr lang="en-US" dirty="0" err="1"/>
+                        <a:t>sẽ</a:t>
+                      </a:r>
+                      <a:r>
+                        <a:rPr lang="en-US" dirty="0"/>
+                        <a:t> </a:t>
+                      </a:r>
+                      <a:r>
+                        <a:rPr lang="en-US" dirty="0" err="1"/>
+                        <a:t>khác</a:t>
+                      </a:r>
+                      <a:r>
+                        <a:rPr lang="en-US" dirty="0"/>
+                        <a:t> </a:t>
+                      </a:r>
+                      <a:r>
+                        <a:rPr lang="en-US" dirty="0" err="1"/>
+                        <a:t>nhau</a:t>
+                      </a:r>
+                      <a:r>
+                        <a:rPr lang="en-US" dirty="0"/>
+                        <a:t>: </a:t>
+                      </a:r>
+                      <a:r>
+                        <a:rPr lang="en-US" dirty="0" err="1"/>
+                        <a:t>tốc</a:t>
+                      </a:r>
+                      <a:r>
+                        <a:rPr lang="en-US" dirty="0"/>
+                        <a:t> </a:t>
+                      </a:r>
+                      <a:r>
+                        <a:rPr lang="en-US" dirty="0" err="1"/>
+                        <a:t>độ</a:t>
+                      </a:r>
+                      <a:r>
+                        <a:rPr lang="en-US" dirty="0"/>
+                        <a:t>, “</a:t>
+                      </a:r>
+                      <a:r>
+                        <a:rPr lang="en-US" dirty="0" err="1"/>
+                        <a:t>hình</a:t>
+                      </a:r>
+                      <a:r>
+                        <a:rPr lang="en-US" dirty="0"/>
+                        <a:t>” </a:t>
+                      </a:r>
+                      <a:r>
+                        <a:rPr lang="en-US" dirty="0" err="1"/>
+                        <a:t>của</a:t>
+                      </a:r>
+                      <a:r>
+                        <a:rPr lang="en-US" dirty="0"/>
+                        <a:t> </a:t>
+                      </a:r>
+                      <a:r>
+                        <a:rPr lang="en-US" dirty="0" err="1"/>
+                        <a:t>tần</a:t>
+                      </a:r>
+                      <a:r>
+                        <a:rPr lang="en-US" dirty="0"/>
+                        <a:t> </a:t>
+                      </a:r>
+                      <a:r>
+                        <a:rPr lang="en-US" dirty="0" err="1"/>
+                        <a:t>số</a:t>
+                      </a:r>
+                      <a:r>
+                        <a:rPr lang="en-US" dirty="0"/>
+                        <a:t> </a:t>
+                      </a:r>
+                      <a:r>
+                        <a:rPr lang="en-US" dirty="0" err="1"/>
+                        <a:t>âm</a:t>
+                      </a:r>
+                      <a:r>
+                        <a:rPr lang="en-US"/>
+                        <a:t>…</a:t>
+                      </a:r>
+                      <a:endParaRPr lang="en-US" dirty="0"/>
+                    </a:p>
+                  </a:txBody>
+                  <a:tcPr/>
+                </a:tc>
+                <a:tc>
+                  <a:txBody>
+                    <a:bodyPr/>
+                    <a:lstStyle/>
+                    <a:p>
+                      <a:r>
+                        <a:rPr lang="en-US" dirty="0"/>
+                        <a:t>Attn: Ko </a:t>
+                      </a:r>
+                      <a:r>
+                        <a:rPr lang="en-US" dirty="0" err="1"/>
+                        <a:t>nhắc</a:t>
+                      </a:r>
+                      <a:r>
+                        <a:rPr lang="en-US" dirty="0"/>
+                        <a:t> </a:t>
+                      </a:r>
+                      <a:r>
+                        <a:rPr lang="en-US" dirty="0" err="1"/>
+                        <a:t>tới</a:t>
+                      </a:r>
+                      <a:r>
+                        <a:rPr lang="en-US" dirty="0"/>
+                        <a:t> </a:t>
+                      </a:r>
+                      <a:r>
+                        <a:rPr lang="en-US" dirty="0" err="1"/>
+                        <a:t>tần</a:t>
+                      </a:r>
+                      <a:r>
+                        <a:rPr lang="en-US" dirty="0"/>
+                        <a:t> </a:t>
+                      </a:r>
+                      <a:r>
+                        <a:rPr lang="en-US" dirty="0" err="1"/>
+                        <a:t>số</a:t>
+                      </a:r>
+                      <a:r>
+                        <a:rPr lang="en-US" dirty="0"/>
+                        <a:t> </a:t>
+                      </a:r>
+                      <a:r>
+                        <a:rPr lang="en-US" dirty="0" err="1"/>
+                        <a:t>âm</a:t>
+                      </a:r>
+                      <a:r>
+                        <a:rPr lang="en-US" dirty="0"/>
+                        <a:t> </a:t>
+                      </a:r>
+                      <a:r>
+                        <a:rPr lang="en-US" dirty="0" err="1"/>
+                        <a:t>thanh</a:t>
+                      </a:r>
+                      <a:r>
+                        <a:rPr lang="en-US" dirty="0"/>
+                        <a:t>, </a:t>
+                      </a:r>
+                      <a:r>
+                        <a:rPr lang="en-US" dirty="0" err="1"/>
+                        <a:t>dao</a:t>
+                      </a:r>
+                      <a:r>
+                        <a:rPr lang="en-US" dirty="0"/>
+                        <a:t> </a:t>
+                      </a:r>
+                      <a:r>
+                        <a:rPr lang="en-US" dirty="0" err="1"/>
+                        <a:t>động</a:t>
+                      </a:r>
+                      <a:r>
+                        <a:rPr lang="en-US" dirty="0"/>
+                        <a:t> </a:t>
+                      </a:r>
+                      <a:r>
+                        <a:rPr lang="en-US" dirty="0" err="1"/>
+                        <a:t>âm</a:t>
+                      </a:r>
+                      <a:r>
+                        <a:rPr lang="en-US" dirty="0"/>
+                        <a:t> </a:t>
+                      </a:r>
+                      <a:r>
+                        <a:rPr lang="en-US" dirty="0" err="1"/>
+                        <a:t>thanh</a:t>
+                      </a:r>
+                      <a:r>
+                        <a:rPr lang="en-US" dirty="0"/>
+                        <a:t>… </a:t>
+                      </a:r>
+                    </a:p>
+                  </a:txBody>
+                  <a:tcPr/>
+                </a:tc>
+                <a:extLst>
+                  <a:ext uri="{0D108BD9-81ED-4DB2-BD59-A6C34878D82A}">
+                    <a16:rowId xmlns:a16="http://schemas.microsoft.com/office/drawing/2014/main" val="3547605734"/>
+                  </a:ext>
+                </a:extLst>
+              </a:tr>
+            </a:tbl>
+          </a:graphicData>
+        </a:graphic>
+      </p:graphicFrame>
     </p:spTree>
     <p:extLst>
       <p:ext uri="{BB962C8B-B14F-4D97-AF65-F5344CB8AC3E}">
@@ -3595,4 +5612,299 @@
     </a:ext>
   </a:extLst>
 </a:theme>
+</file>
+
+<file path=ppt/theme/theme2.xml><?xml version="1.0" encoding="utf-8"?>
+<a:theme xmlns:a="http://schemas.openxmlformats.org/drawingml/2006/main" name="Office Theme">
+  <a:themeElements>
+    <a:clrScheme name="Office">
+      <a:dk1>
+        <a:sysClr val="windowText" lastClr="000000"/>
+      </a:dk1>
+      <a:lt1>
+        <a:sysClr val="window" lastClr="FFFFFF"/>
+      </a:lt1>
+      <a:dk2>
+        <a:srgbClr val="44546A"/>
+      </a:dk2>
+      <a:lt2>
+        <a:srgbClr val="E7E6E6"/>
+      </a:lt2>
+      <a:accent1>
+        <a:srgbClr val="4472C4"/>
+      </a:accent1>
+      <a:accent2>
+        <a:srgbClr val="ED7D31"/>
+      </a:accent2>
+      <a:accent3>
+        <a:srgbClr val="A5A5A5"/>
+      </a:accent3>
+      <a:accent4>
+        <a:srgbClr val="FFC000"/>
+      </a:accent4>
+      <a:accent5>
+        <a:srgbClr val="5B9BD5"/>
+      </a:accent5>
+      <a:accent6>
+        <a:srgbClr val="70AD47"/>
+      </a:accent6>
+      <a:hlink>
+        <a:srgbClr val="0563C1"/>
+      </a:hlink>
+      <a:folHlink>
+        <a:srgbClr val="954F72"/>
+      </a:folHlink>
+    </a:clrScheme>
+    <a:fontScheme name="Office">
+      <a:majorFont>
+        <a:latin typeface="Calibri Light" panose="020F0302020204030204"/>
+        <a:ea typeface=""/>
+        <a:cs typeface=""/>
+        <a:font script="Jpan" typeface="游ゴシック Light"/>
+        <a:font script="Hang" typeface="맑은 고딕"/>
+        <a:font script="Hans" typeface="等线 Light"/>
+        <a:font script="Hant" typeface="新細明體"/>
+        <a:font script="Arab" typeface="Times New Roman"/>
+        <a:font script="Hebr" typeface="Times New Roman"/>
+        <a:font script="Thai" typeface="Angsana New"/>
+        <a:font script="Ethi" typeface="Nyala"/>
+        <a:font script="Beng" typeface="Vrinda"/>
+        <a:font script="Gujr" typeface="Shruti"/>
+        <a:font script="Khmr" typeface="MoolBoran"/>
+        <a:font script="Knda" typeface="Tunga"/>
+        <a:font script="Guru" typeface="Raavi"/>
+        <a:font script="Cans" typeface="Euphemia"/>
+        <a:font script="Cher" typeface="Plantagenet Cherokee"/>
+        <a:font script="Yiii" typeface="Microsoft Yi Baiti"/>
+        <a:font script="Tibt" typeface="Microsoft Himalaya"/>
+        <a:font script="Thaa" typeface="MV Boli"/>
+        <a:font script="Deva" typeface="Mangal"/>
+        <a:font script="Telu" typeface="Gautami"/>
+        <a:font script="Taml" typeface="Latha"/>
+        <a:font script="Syrc" typeface="Estrangelo Edessa"/>
+        <a:font script="Orya" typeface="Kalinga"/>
+        <a:font script="Mlym" typeface="Kartika"/>
+        <a:font script="Laoo" typeface="DokChampa"/>
+        <a:font script="Sinh" typeface="Iskoola Pota"/>
+        <a:font script="Mong" typeface="Mongolian Baiti"/>
+        <a:font script="Viet" typeface="Times New Roman"/>
+        <a:font script="Uigh" typeface="Microsoft Uighur"/>
+        <a:font script="Geor" typeface="Sylfaen"/>
+        <a:font script="Armn" typeface="Arial"/>
+        <a:font script="Bugi" typeface="Leelawadee UI"/>
+        <a:font script="Bopo" typeface="Microsoft JhengHei"/>
+        <a:font script="Java" typeface="Javanese Text"/>
+        <a:font script="Lisu" typeface="Segoe UI"/>
+        <a:font script="Mymr" typeface="Myanmar Text"/>
+        <a:font script="Nkoo" typeface="Ebrima"/>
+        <a:font script="Olck" typeface="Nirmala UI"/>
+        <a:font script="Osma" typeface="Ebrima"/>
+        <a:font script="Phag" typeface="Phagspa"/>
+        <a:font script="Syrn" typeface="Estrangelo Edessa"/>
+        <a:font script="Syrj" typeface="Estrangelo Edessa"/>
+        <a:font script="Syre" typeface="Estrangelo Edessa"/>
+        <a:font script="Sora" typeface="Nirmala UI"/>
+        <a:font script="Tale" typeface="Microsoft Tai Le"/>
+        <a:font script="Talu" typeface="Microsoft New Tai Lue"/>
+        <a:font script="Tfng" typeface="Ebrima"/>
+      </a:majorFont>
+      <a:minorFont>
+        <a:latin typeface="Calibri" panose="020F0502020204030204"/>
+        <a:ea typeface=""/>
+        <a:cs typeface=""/>
+        <a:font script="Jpan" typeface="游ゴシック"/>
+        <a:font script="Hang" typeface="맑은 고딕"/>
+        <a:font script="Hans" typeface="等线"/>
+        <a:font script="Hant" typeface="新細明體"/>
+        <a:font script="Arab" typeface="Arial"/>
+        <a:font script="Hebr" typeface="Arial"/>
+        <a:font script="Thai" typeface="Cordia New"/>
+        <a:font script="Ethi" typeface="Nyala"/>
+        <a:font script="Beng" typeface="Vrinda"/>
+        <a:font script="Gujr" typeface="Shruti"/>
+        <a:font script="Khmr" typeface="DaunPenh"/>
+        <a:font script="Knda" typeface="Tunga"/>
+        <a:font script="Guru" typeface="Raavi"/>
+        <a:font script="Cans" typeface="Euphemia"/>
+        <a:font script="Cher" typeface="Plantagenet Cherokee"/>
+        <a:font script="Yiii" typeface="Microsoft Yi Baiti"/>
+        <a:font script="Tibt" typeface="Microsoft Himalaya"/>
+        <a:font script="Thaa" typeface="MV Boli"/>
+        <a:font script="Deva" typeface="Mangal"/>
+        <a:font script="Telu" typeface="Gautami"/>
+        <a:font script="Taml" typeface="Latha"/>
+        <a:font script="Syrc" typeface="Estrangelo Edessa"/>
+        <a:font script="Orya" typeface="Kalinga"/>
+        <a:font script="Mlym" typeface="Kartika"/>
+        <a:font script="Laoo" typeface="DokChampa"/>
+        <a:font script="Sinh" typeface="Iskoola Pota"/>
+        <a:font script="Mong" typeface="Mongolian Baiti"/>
+        <a:font script="Viet" typeface="Arial"/>
+        <a:font script="Uigh" typeface="Microsoft Uighur"/>
+        <a:font script="Geor" typeface="Sylfaen"/>
+        <a:font script="Armn" typeface="Arial"/>
+        <a:font script="Bugi" typeface="Leelawadee UI"/>
+        <a:font script="Bopo" typeface="Microsoft JhengHei"/>
+        <a:font script="Java" typeface="Javanese Text"/>
+        <a:font script="Lisu" typeface="Segoe UI"/>
+        <a:font script="Mymr" typeface="Myanmar Text"/>
+        <a:font script="Nkoo" typeface="Ebrima"/>
+        <a:font script="Olck" typeface="Nirmala UI"/>
+        <a:font script="Osma" typeface="Ebrima"/>
+        <a:font script="Phag" typeface="Phagspa"/>
+        <a:font script="Syrn" typeface="Estrangelo Edessa"/>
+        <a:font script="Syrj" typeface="Estrangelo Edessa"/>
+        <a:font script="Syre" typeface="Estrangelo Edessa"/>
+        <a:font script="Sora" typeface="Nirmala UI"/>
+        <a:font script="Tale" typeface="Microsoft Tai Le"/>
+        <a:font script="Talu" typeface="Microsoft New Tai Lue"/>
+        <a:font script="Tfng" typeface="Ebrima"/>
+      </a:minorFont>
+    </a:fontScheme>
+    <a:fmtScheme name="Office">
+      <a:fillStyleLst>
+        <a:solidFill>
+          <a:schemeClr val="phClr"/>
+        </a:solidFill>
+        <a:gradFill rotWithShape="1">
+          <a:gsLst>
+            <a:gs pos="0">
+              <a:schemeClr val="phClr">
+                <a:lumMod val="110000"/>
+                <a:satMod val="105000"/>
+                <a:tint val="67000"/>
+              </a:schemeClr>
+            </a:gs>
+            <a:gs pos="50000">
+              <a:schemeClr val="phClr">
+                <a:lumMod val="105000"/>
+                <a:satMod val="103000"/>
+                <a:tint val="73000"/>
+              </a:schemeClr>
+            </a:gs>
+            <a:gs pos="100000">
+              <a:schemeClr val="phClr">
+                <a:lumMod val="105000"/>
+                <a:satMod val="109000"/>
+                <a:tint val="81000"/>
+              </a:schemeClr>
+            </a:gs>
+          </a:gsLst>
+          <a:lin ang="5400000" scaled="0"/>
+        </a:gradFill>
+        <a:gradFill rotWithShape="1">
+          <a:gsLst>
+            <a:gs pos="0">
+              <a:schemeClr val="phClr">
+                <a:satMod val="103000"/>
+                <a:lumMod val="102000"/>
+                <a:tint val="94000"/>
+              </a:schemeClr>
+            </a:gs>
+            <a:gs pos="50000">
+              <a:schemeClr val="phClr">
+                <a:satMod val="110000"/>
+                <a:lumMod val="100000"/>
+                <a:shade val="100000"/>
+              </a:schemeClr>
+            </a:gs>
+            <a:gs pos="100000">
+              <a:schemeClr val="phClr">
+                <a:lumMod val="99000"/>
+                <a:satMod val="120000"/>
+                <a:shade val="78000"/>
+              </a:schemeClr>
+            </a:gs>
+          </a:gsLst>
+          <a:lin ang="5400000" scaled="0"/>
+        </a:gradFill>
+      </a:fillStyleLst>
+      <a:lnStyleLst>
+        <a:ln w="6350" cap="flat" cmpd="sng" algn="ctr">
+          <a:solidFill>
+            <a:schemeClr val="phClr"/>
+          </a:solidFill>
+          <a:prstDash val="solid"/>
+          <a:miter lim="800000"/>
+        </a:ln>
+        <a:ln w="12700" cap="flat" cmpd="sng" algn="ctr">
+          <a:solidFill>
+            <a:schemeClr val="phClr"/>
+          </a:solidFill>
+          <a:prstDash val="solid"/>
+          <a:miter lim="800000"/>
+        </a:ln>
+        <a:ln w="19050" cap="flat" cmpd="sng" algn="ctr">
+          <a:solidFill>
+            <a:schemeClr val="phClr"/>
+          </a:solidFill>
+          <a:prstDash val="solid"/>
+          <a:miter lim="800000"/>
+        </a:ln>
+      </a:lnStyleLst>
+      <a:effectStyleLst>
+        <a:effectStyle>
+          <a:effectLst/>
+        </a:effectStyle>
+        <a:effectStyle>
+          <a:effectLst/>
+        </a:effectStyle>
+        <a:effectStyle>
+          <a:effectLst>
+            <a:outerShdw blurRad="57150" dist="19050" dir="5400000" algn="ctr" rotWithShape="0">
+              <a:srgbClr val="000000">
+                <a:alpha val="63000"/>
+              </a:srgbClr>
+            </a:outerShdw>
+          </a:effectLst>
+        </a:effectStyle>
+      </a:effectStyleLst>
+      <a:bgFillStyleLst>
+        <a:solidFill>
+          <a:schemeClr val="phClr"/>
+        </a:solidFill>
+        <a:solidFill>
+          <a:schemeClr val="phClr">
+            <a:tint val="95000"/>
+            <a:satMod val="170000"/>
+          </a:schemeClr>
+        </a:solidFill>
+        <a:gradFill rotWithShape="1">
+          <a:gsLst>
+            <a:gs pos="0">
+              <a:schemeClr val="phClr">
+                <a:tint val="93000"/>
+                <a:satMod val="150000"/>
+                <a:shade val="98000"/>
+                <a:lumMod val="102000"/>
+              </a:schemeClr>
+            </a:gs>
+            <a:gs pos="50000">
+              <a:schemeClr val="phClr">
+                <a:tint val="98000"/>
+                <a:satMod val="130000"/>
+                <a:shade val="90000"/>
+                <a:lumMod val="103000"/>
+              </a:schemeClr>
+            </a:gs>
+            <a:gs pos="100000">
+              <a:schemeClr val="phClr">
+                <a:shade val="63000"/>
+                <a:satMod val="120000"/>
+              </a:schemeClr>
+            </a:gs>
+          </a:gsLst>
+          <a:lin ang="5400000" scaled="0"/>
+        </a:gradFill>
+      </a:bgFillStyleLst>
+    </a:fmtScheme>
+  </a:themeElements>
+  <a:objectDefaults/>
+  <a:extraClrSchemeLst/>
+  <a:extLst>
+    <a:ext uri="{05A4C25C-085E-4340-85A3-A5531E510DB2}">
+      <thm15:themeFamily xmlns:thm15="http://schemas.microsoft.com/office/thememl/2012/main" name="Office Theme" id="{62F939B6-93AF-4DB8-9C6B-D6C7DFDC589F}" vid="{4A3C46E8-61CC-4603-A589-7422A47A8E4A}"/>
+    </a:ext>
+  </a:extLst>
+</a:theme>
 </file>
</xml_diff>